<commit_message>
output the markdown file in bullet points
</commit_message>
<xml_diff>
--- a/ppt_generator/my_ppts/attention_mode1.pptx
+++ b/ppt_generator/my_ppts/attention_mode1.pptx
@@ -3151,7 +3151,7 @@
               </a:defRPr>
             </a:pPr>
             <a:r>
-              <a:t>"Transformer Architecture: Advancing Machine Translation and English Parsing with Attention Mechanisms"</a:t>
+              <a:t>"Transformer Architecture: Advancing Machine Translation and Parsing with Efficient Training"</a:t>
             </a:r>
           </a:p>
         </p:txBody>
@@ -3176,7 +3176,7 @@
       <p:grpSpPr/>
       <p:pic>
         <p:nvPicPr>
-          <p:cNvPr id="2" name="Picture 1" descr="bg1.png"/>
+          <p:cNvPr id="2" name="Picture 1" descr="bg3.png"/>
           <p:cNvPicPr>
             <a:picLocks noChangeAspect="1"/>
           </p:cNvPicPr>
@@ -3270,27 +3270,27 @@
             <a:br/>
             <a:br/>
             <a:r>
-              <a:t>1. Introduction of the Transformer model.</a:t>
-            </a:r>
-            <a:br/>
-            <a:br/>
-            <a:r>
-              <a:t>2. Transformer's reliance on attention mechanisms.</a:t>
-            </a:r>
-            <a:br/>
-            <a:br/>
-            <a:r>
-              <a:t>3. Efficiency in training machine translation models.</a:t>
-            </a:r>
-            <a:br/>
-            <a:br/>
-            <a:r>
-              <a:t>4. Benchmark-setting performance in translation tasks.</a:t>
-            </a:r>
-            <a:br/>
-            <a:br/>
-            <a:r>
-              <a:t>5. Application to English constituency parsing.</a:t>
+              <a:t>1. Introduction of the Transformer architecture.</a:t>
+            </a:r>
+            <a:br/>
+            <a:br/>
+            <a:r>
+              <a:t>2. Superior machine translation performance.</a:t>
+            </a:r>
+            <a:br/>
+            <a:br/>
+            <a:r>
+              <a:t>3. Efficient and rapid training process.</a:t>
+            </a:r>
+            <a:br/>
+            <a:br/>
+            <a:r>
+              <a:t>4. Generalization across various machine learning tasks.</a:t>
+            </a:r>
+            <a:br/>
+            <a:br/>
+            <a:r>
+              <a:t>5. Cost-effectiveness in training and research applicability.</a:t>
             </a:r>
             <a:br/>
             <a:br/>
@@ -3409,7 +3409,27 @@
               </a:defRPr>
             </a:pPr>
             <a:r>
-              <a:t>In the rapidly evolving landscape of neural network architectures, the introduction of the Transformer marks a significant leap forward, particularly in the realm of machine translation. This pioneering model, predicated entirely on attention mechanisms, eschews the conventionally employed recurrent layers in encoder-decoder frameworks, opting instead for multi-headed self-attention. This paradigm shift not only enhances the efficiency of the training process but also substantially reduces the time required, as evidenced by its superior performance in the WMT 2014 English-to-German and English-to-French translation tasks, where it set new benchmarks, surpassing even the most advanced ensemble models. Moreover, the Transformer's versatility is further underscored by its successful application to English constituency parsing, a task characterized by stringent structural constraints and outputs that extend well beyond the length of the inputs. Despite minimal task-specific tuning, the Transformer demonstrates remarkable generalization capabilities, outperforming established RNN sequence-to-sequence models and even the Berkeley Parser when trained solely on the Wall Street Journal portion of the Penn Treebank. This adaptability, coupled with the potential for application across various input and output modalities beyond text, positions the Transformer as a transformative force in neural network architecture, promising advancements in processing large-scale inputs and outputs such as images, audio, and video. The open-source availability of the model's training and evaluation code further catalyzes its potential for widespread adoption and iterative enhancement within the research community.</a:t>
+              <a:t>- The advent of the Transformer architecture marks a paradigm shift in sequence transduction models, traditionally dominated by recurrent or convolutional neural networks. This innovative approach, introduced by Vaswani et al., hinges entirely on attention mechanisms, effectively bypassing the need for recurrence and convolution in neural network design. </a:t>
+            </a:r>
+            <a:br/>
+            <a:br/>
+            <a:r>
+              <a:t>- The Transformer's proficiency in machine translation is underscored by its remarkable performance on benchmark tasks such as the WMT 2014 English-to-German and English-to-French translation tasks, where it not only achieved state-of-the-art results but also surpassed ensemble models with a significant margin.</a:t>
+            </a:r>
+            <a:br/>
+            <a:br/>
+            <a:r>
+              <a:t>- Central to the Transformer's success is its training efficiency; it can be trained more rapidly than its recurrent or convolutional counterparts, thanks to its inherent parallelizable structure. This efficiency is exemplified by the model's ability to reach a new peak BLEU score of 41.8 on the English-to-French task after just 3.5 days of training on eight GPUs—a fraction of the resources previously required.</a:t>
+            </a:r>
+            <a:br/>
+            <a:br/>
+            <a:r>
+              <a:t>- The architecture's utility extends beyond machine translation, demonstrating a promising capacity to generalize across various tasks, including English constituency parsing. This versatility is a testament to the Transformer's robust design and its potential to revolutionize different areas of machine learning.</a:t>
+            </a:r>
+            <a:br/>
+            <a:br/>
+            <a:r>
+              <a:t>- The training process of the Transformer is a key sub-idea, where the model's ability to process data in parallel significantly cuts down training time without compromising the quality of the output. This aspect not only makes the Transformer cost-effective but also opens up new avenues for research and application in processing large and complex datasets.</a:t>
             </a:r>
           </a:p>
         </p:txBody>
@@ -3434,7 +3454,7 @@
       <p:grpSpPr/>
       <p:pic>
         <p:nvPicPr>
-          <p:cNvPr id="2" name="Picture 1" descr="bg1.png"/>
+          <p:cNvPr id="2" name="Picture 1" descr="bg3.png"/>
           <p:cNvPicPr>
             <a:picLocks noChangeAspect="1"/>
           </p:cNvPicPr>
@@ -3487,7 +3507,7 @@
               </a:defRPr>
             </a:pPr>
             <a:r>
-              <a:t>1. Introduction of the Transformer model.</a:t>
+              <a:t>1. Introduction of the Transformer architecture.</a:t>
             </a:r>
           </a:p>
         </p:txBody>
@@ -3523,7 +3543,27 @@
               </a:defRPr>
             </a:pPr>
             <a:r>
-              <a:t>The Transformer model is a groundbreaking neural network architecture that revolutionizes machine translation. It eschews recurrent and convolutional layers, relying solely on attention mechanisms to deliver superior performance and efficiency. This innovative design allows for more parallelization and significantly reduces training time. Notably, the Transformer achieves state-of-the-art results in English-to-German and English-to-French translation tasks, surpassing previous models. Its versatility is further evidenced by its successful application to English constituency parsing, where it outperforms RNN sequence-to-sequence models, even with limited task-specific tuning.</a:t>
+              <a:t>- Transformer: a novel network architecture.</a:t>
+            </a:r>
+            <a:br/>
+            <a:br/>
+            <a:r>
+              <a:t>- Uses attention mechanisms; no recurrence.</a:t>
+            </a:r>
+            <a:br/>
+            <a:br/>
+            <a:r>
+              <a:t>- Excels in machine translation tasks.</a:t>
+            </a:r>
+            <a:br/>
+            <a:br/>
+            <a:r>
+              <a:t>- Adapts well to English constituency parsing.</a:t>
+            </a:r>
+            <a:br/>
+            <a:br/>
+            <a:r>
+              <a:t>- Efficient and less time-consuming training.</a:t>
             </a:r>
           </a:p>
         </p:txBody>
@@ -3601,7 +3641,7 @@
               </a:defRPr>
             </a:pPr>
             <a:r>
-              <a:t>2. Transformer's reliance on attention mechanisms.</a:t>
+              <a:t>2. Superior machine translation performance.</a:t>
             </a:r>
           </a:p>
         </p:txBody>
@@ -3637,7 +3677,27 @@
               </a:defRPr>
             </a:pPr>
             <a:r>
-              <a:t>The Transformer architecture revolutionizes neural network approaches to language understanding, primarily through its reliance on attention mechanisms. Unlike previous models that processed inputs sequentially, the Transformer concurrently processes all words of the input sentence, allowing for more parallelization and thus faster training times. This is achieved by the self-attention mechanism, which computes the representation of each word by considering the entire input sequence. The model assigns varying levels of importance, or 'attention', to each word in a sentence, enabling it to capture context more effectively and produce more nuanced translations. This attention-based approach is not only integral for machine translation but also proves beneficial for complex tasks like English constituency parsing, showcasing the Transformer's versatility and superior performance over recurrent neural network (RNN) models, especially in smaller data scenarios.</a:t>
+              <a:t>- Transformer architecture achieves high-quality machine translation.</a:t>
+            </a:r>
+            <a:br/>
+            <a:br/>
+            <a:r>
+              <a:t>- Dispenses with recurrent, convolutional models for attention-based approach.</a:t>
+            </a:r>
+            <a:br/>
+            <a:br/>
+            <a:r>
+              <a:t>- Outperforms previous models with 28.4 BLEU in English-to-German task.</a:t>
+            </a:r>
+            <a:br/>
+            <a:br/>
+            <a:r>
+              <a:t>- Sets new record with 41.8 BLEU in English-to-French task.</a:t>
+            </a:r>
+            <a:br/>
+            <a:br/>
+            <a:r>
+              <a:t>- Requires significantly less training time on fewer GPUs.</a:t>
             </a:r>
           </a:p>
         </p:txBody>
@@ -3715,7 +3775,7 @@
               </a:defRPr>
             </a:pPr>
             <a:r>
-              <a:t>3. Efficiency in training machine translation models.</a:t>
+              <a:t>3. Efficient and rapid training process.</a:t>
             </a:r>
           </a:p>
         </p:txBody>
@@ -3751,7 +3811,22 @@
               </a:defRPr>
             </a:pPr>
             <a:r>
-              <a:t>The Transformer architecture marks a significant advancement in machine translation efficiency. It eliminates the need for recurrent or convolutional layers, relying solely on attention mechanisms. This design choice not only simplifies the network but also enhances parallelization, leading to a substantial reduction in training time. Remarkably, the Transformer achieves superior translation quality, evidenced by its impressive BLEU scores on English-to-German and English-to-French tasks. Its efficiency is further highlighted by the fact that it reached state-of-the-art performance on the WMT 2014 tasks with just 3.5 days of training on eight GPUs, a fraction of the resources previously required. This leap in efficiency without compromising quality demonstrates the Transformer's potential to revolutionize the field of machine translation.</a:t>
+              <a:t>- Transformer architecture streamlines training, outperforming prior models.</a:t>
+            </a:r>
+            <a:br/>
+            <a:br/>
+            <a:r>
+              <a:t>- Achieves state-of-the-art BLEU scores in machine translation tasks.</a:t>
+            </a:r>
+            <a:br/>
+            <a:br/>
+            <a:r>
+              <a:t>- Adapts to English constituency parsing, showing versatility.</a:t>
+            </a:r>
+            <a:br/>
+            <a:br/>
+            <a:r>
+              <a:t>- Trains rapidly on GPUs, reducing time and resource costs.</a:t>
             </a:r>
           </a:p>
         </p:txBody>
@@ -3829,7 +3904,7 @@
               </a:defRPr>
             </a:pPr>
             <a:r>
-              <a:t>4. Benchmark-setting performance in translation tasks.</a:t>
+              <a:t>4. Generalization across various machine learning tasks.</a:t>
             </a:r>
           </a:p>
         </p:txBody>
@@ -3865,7 +3940,22 @@
               </a:defRPr>
             </a:pPr>
             <a:r>
-              <a:t>The Transformer model sets new benchmarks in translation, achieving a BLEU score of 28.4 in English-to-German and 41.8 in English-to-French, surpassing previous models while reducing training time.</a:t>
+              <a:t>- Transformer excels in machine translation.</a:t>
+            </a:r>
+            <a:br/>
+            <a:br/>
+            <a:r>
+              <a:t>- Uses attention mechanisms; no recurrence/convolution.</a:t>
+            </a:r>
+            <a:br/>
+            <a:br/>
+            <a:r>
+              <a:t>- Adapts well to English constituency parsing.</a:t>
+            </a:r>
+            <a:br/>
+            <a:br/>
+            <a:r>
+              <a:t>- Efficient training processes for diverse tasks.</a:t>
             </a:r>
           </a:p>
         </p:txBody>
@@ -3890,7 +3980,7 @@
       <p:grpSpPr/>
       <p:pic>
         <p:nvPicPr>
-          <p:cNvPr id="2" name="Picture 1" descr="bg1.png"/>
+          <p:cNvPr id="2" name="Picture 1" descr="bg3.png"/>
           <p:cNvPicPr>
             <a:picLocks noChangeAspect="1"/>
           </p:cNvPicPr>
@@ -3943,7 +4033,7 @@
               </a:defRPr>
             </a:pPr>
             <a:r>
-              <a:t>5. Application to English constituency parsing.</a:t>
+              <a:t>5. Cost-effectiveness in training and research applicability.</a:t>
             </a:r>
           </a:p>
         </p:txBody>
@@ -3979,7 +4069,27 @@
               </a:defRPr>
             </a:pPr>
             <a:r>
-              <a:t>The Transformer, a novel architecture introduced by Vaswani et al., showcases remarkable versatility beyond machine translation. Its application to English constituency parsing, a task where outputs are structurally complex and longer than inputs, demonstrates this adaptability. Despite minimal task-specific tuning and the challenges posed by the task's structural demands, the Transformer achieves impressive results. Trained on the Wall Street Journal section of the Penn Treebank with 40K sentences and further in a semi-supervised manner with an extended corpus of 17M sentences, it outperforms many traditional models. This is notable as RNN sequence-to-sequence models have struggled in similar small-data scenarios. The Transformer's performance on the WSJ-only and semi-supervised settings, with F1 scores of 91.3 and 92.7 respectively, underscores its potential as a generalizable model for various NLP tasks.</a:t>
+              <a:t>- Transformer architecture reduces training time.</a:t>
+            </a:r>
+            <a:br/>
+            <a:br/>
+            <a:r>
+              <a:t>- Achieves state-of-the-art results on translation tasks.</a:t>
+            </a:r>
+            <a:br/>
+            <a:br/>
+            <a:r>
+              <a:t>- Adaptable to English constituency parsing.</a:t>
+            </a:r>
+            <a:br/>
+            <a:br/>
+            <a:r>
+              <a:t>- Efficient training on standard and semi-supervised datasets.</a:t>
+            </a:r>
+            <a:br/>
+            <a:br/>
+            <a:r>
+              <a:t>- Cost-effective due to less computational resource usage.</a:t>
             </a:r>
           </a:p>
         </p:txBody>
@@ -4093,7 +4203,27 @@
               </a:defRPr>
             </a:pPr>
             <a:r>
-              <a:t>In conclusion, the Transformer represents a paradigm shift in neural network architectures, with its core reliance on attention mechanisms rather than traditional recurrent or convolutional layers. This innovative approach has not only set new precedents in machine translation tasks, as demonstrated by its remarkable BLEU scores on the WMT 2014 benchmarks, but has also shown exceptional adaptability to complex tasks such as English constituency parsing. The model's efficiency in training and its ability to handle significantly longer outputs with strong structural constraints highlight its potential for broader applications. Its performance, outstripping RNNs and the Berkeley Parser with minimal task-specific tuning, underscores the model's robustness and versatility. The Transformer's capacity to process various input and output modalities opens up new avenues for research and application, extending beyond textual data to include images, audio, and video. The open-source availability of its code invites the research community to further explore, refine, and expand upon this groundbreaking architecture. As we continue to push the boundaries of what is possible with neural networks, the Transformer stands as a testament to the power of attention-based models, heralding a new era of efficiency and adaptability in artificial intelligence.</a:t>
+              <a:t>- In conclusion, the Transformer architecture represents a significant advancement in the field of sequence transduction, moving away from the traditional reliance on recurrent or convolutional neural networks. By fully embracing attention mechanisms, the Transformer offers a more streamlined and efficient approach to machine learning tasks.</a:t>
+            </a:r>
+            <a:br/>
+            <a:br/>
+            <a:r>
+              <a:t>- Its exceptional performance in machine translation, particularly in the WMT 2014 English-to-German and English-to-French tasks, has set new benchmarks for the field. The Transformer's ability to outperform ensemble models while requiring fewer training resources is a clear indication of its superior design.</a:t>
+            </a:r>
+            <a:br/>
+            <a:br/>
+            <a:r>
+              <a:t>- The training process of the Transformer is notably efficient, leveraging its parallelizable nature to reduce training times dramatically. This efficiency is not just a theoretical advantage but has been empirically demonstrated in its rapid achievement of a 41.8 BLEU score on the English-to-French translation task with minimal computational expense.</a:t>
+            </a:r>
+            <a:br/>
+            <a:br/>
+            <a:r>
+              <a:t>- Beyond machine translation, the Transformer's design principles have proven to be broadly applicable, showing great promise in generalizing to a variety of other machine learning tasks. This adaptability underscores the transformative potential of the architecture across the broader landscape of artificial intelligence research.</a:t>
+            </a:r>
+            <a:br/>
+            <a:br/>
+            <a:r>
+              <a:t>- The cost-effectiveness and reduced training duration of the Transformer do not only benefit the research community in terms of resource allocation but also pave the way for more sustainable and scalable machine learning solutions, making advanced AI more accessible and practical for real-world applications.</a:t>
             </a:r>
           </a:p>
         </p:txBody>

</xml_diff>

<commit_message>
update intro / conclusion prompt requirement
</commit_message>
<xml_diff>
--- a/ppt_generator/my_ppts/attention_mode1.pptx
+++ b/ppt_generator/my_ppts/attention_mode1.pptx
@@ -13,7 +13,6 @@
     <p:sldId id="261" r:id="rId12"/>
     <p:sldId id="262" r:id="rId13"/>
     <p:sldId id="263" r:id="rId14"/>
-    <p:sldId id="264" r:id="rId15"/>
   </p:sldIdLst>
   <p:sldSz cx="9144000" cy="5144400" type="screen4x3"/>
   <p:notesSz cx="6858000" cy="9144000"/>
@@ -3151,7 +3150,7 @@
               </a:defRPr>
             </a:pPr>
             <a:r>
-              <a:t>"Transformer Architecture: Advancing Machine Translation and Parsing with Efficient Training"</a:t>
+              <a:t>"Transformer Network Mastery in Machine Translation and Parsing" "Versatile Linguistic Processing with Attention Mechanisms"</a:t>
             </a:r>
           </a:p>
         </p:txBody>
@@ -3270,27 +3269,12 @@
             <a:br/>
             <a:br/>
             <a:r>
-              <a:t>1. Introduction of the Transformer architecture.</a:t>
+              <a:t>Transformer model's impact on machine translation.</a:t>
             </a:r>
             <a:br/>
             <a:br/>
             <a:r>
-              <a:t>2. Superior machine translation performance.</a:t>
-            </a:r>
-            <a:br/>
-            <a:br/>
-            <a:r>
-              <a:t>3. Efficient and rapid training process.</a:t>
-            </a:r>
-            <a:br/>
-            <a:br/>
-            <a:r>
-              <a:t>4. Generalization across various machine learning tasks.</a:t>
-            </a:r>
-            <a:br/>
-            <a:br/>
-            <a:r>
-              <a:t>5. Cost-effectiveness in training and research applicability.</a:t>
+              <a:t>Adaptation to English constituency parsing challenges.</a:t>
             </a:r>
             <a:br/>
             <a:br/>
@@ -3409,27 +3393,7 @@
               </a:defRPr>
             </a:pPr>
             <a:r>
-              <a:t>- The advent of the Transformer architecture marks a paradigm shift in sequence transduction models, traditionally dominated by recurrent or convolutional neural networks. This innovative approach, introduced by Vaswani et al., hinges entirely on attention mechanisms, effectively bypassing the need for recurrence and convolution in neural network design. </a:t>
-            </a:r>
-            <a:br/>
-            <a:br/>
-            <a:r>
-              <a:t>- The Transformer's proficiency in machine translation is underscored by its remarkable performance on benchmark tasks such as the WMT 2014 English-to-German and English-to-French translation tasks, where it not only achieved state-of-the-art results but also surpassed ensemble models with a significant margin.</a:t>
-            </a:r>
-            <a:br/>
-            <a:br/>
-            <a:r>
-              <a:t>- Central to the Transformer's success is its training efficiency; it can be trained more rapidly than its recurrent or convolutional counterparts, thanks to its inherent parallelizable structure. This efficiency is exemplified by the model's ability to reach a new peak BLEU score of 41.8 on the English-to-French task after just 3.5 days of training on eight GPUs—a fraction of the resources previously required.</a:t>
-            </a:r>
-            <a:br/>
-            <a:br/>
-            <a:r>
-              <a:t>- The architecture's utility extends beyond machine translation, demonstrating a promising capacity to generalize across various tasks, including English constituency parsing. This versatility is a testament to the Transformer's robust design and its potential to revolutionize different areas of machine learning.</a:t>
-            </a:r>
-            <a:br/>
-            <a:br/>
-            <a:r>
-              <a:t>- The training process of the Transformer is a key sub-idea, where the model's ability to process data in parallel significantly cuts down training time without compromising the quality of the output. This aspect not only makes the Transformer cost-effective but also opens up new avenues for research and application in processing large and complex datasets.</a:t>
+              <a:t>- The advent of the Transformer model marks a significant milestone in the evolution of neural network architectures, particularly in the realm of machine translation. Developed as the first sequence transduction model that operates entirely on attention mechanisms, it eschews traditional recurrent layers in favor of multi-headed self-attention. This innovative approach not only streamlines the training process but also enhances the model's ability to manage long-range dependencies within the text. The Transformer's proficiency is underscored by its remarkable performance in WMT 2014 English-to-German and English-to-French translation tasks, where it set new benchmarks, surpassing even the combined efforts of previous ensemble models.</a:t>
             </a:r>
           </a:p>
         </p:txBody>
@@ -3506,9 +3470,6 @@
                 <a:latin typeface="Calibri"/>
               </a:defRPr>
             </a:pPr>
-            <a:r>
-              <a:t>1. Introduction of the Transformer architecture.</a:t>
-            </a:r>
           </a:p>
         </p:txBody>
       </p:sp>
@@ -3543,27 +3504,7 @@
               </a:defRPr>
             </a:pPr>
             <a:r>
-              <a:t>- Transformer: a novel network architecture.</a:t>
-            </a:r>
-            <a:br/>
-            <a:br/>
-            <a:r>
-              <a:t>- Uses attention mechanisms; no recurrence.</a:t>
-            </a:r>
-            <a:br/>
-            <a:br/>
-            <a:r>
-              <a:t>- Excels in machine translation tasks.</a:t>
-            </a:r>
-            <a:br/>
-            <a:br/>
-            <a:r>
-              <a:t>- Adapts well to English constituency parsing.</a:t>
-            </a:r>
-            <a:br/>
-            <a:br/>
-            <a:r>
-              <a:t>- Efficient and less time-consuming training.</a:t>
+              <a:t>- Further cementing its status as a versatile tool in natural language processing, the Transformer has been adeptly adapted for English constituency parsing—a task that poses its own unique set of challenges due to the intricate structural constraints and the typically longer output sequences compared to the inputs. Despite these hurdles, the Transformer, trained on the Wall Street Journal portion of the Penn Treebank with a 4-layer architecture and a model dimensionality of 1024, has shown promising results. Its ability to generalize to other tasks was further explored through semi-supervised learning, utilizing a vast corpus of approximately 17 million sentences, which led to a significant expansion of its vocabulary size from 16K to 32K tokens. This adaptability not only demonstrates the model's robustness but also its potential to revolutionize various facets of machine learning involving complex linguistic data.</a:t>
             </a:r>
           </a:p>
         </p:txBody>
@@ -3641,7 +3582,7 @@
               </a:defRPr>
             </a:pPr>
             <a:r>
-              <a:t>2. Superior machine translation performance.</a:t>
+              <a:t>Transformer model's impact on machine translation.</a:t>
             </a:r>
           </a:p>
         </p:txBody>
@@ -3677,27 +3618,12 @@
               </a:defRPr>
             </a:pPr>
             <a:r>
-              <a:t>- Transformer architecture achieves high-quality machine translation.</a:t>
+              <a:t>- Transformer revolutionizes machine translation with self-attention.</a:t>
             </a:r>
             <a:br/>
             <a:br/>
             <a:r>
-              <a:t>- Dispenses with recurrent, convolutional models for attention-based approach.</a:t>
-            </a:r>
-            <a:br/>
-            <a:br/>
-            <a:r>
-              <a:t>- Outperforms previous models with 28.4 BLEU in English-to-German task.</a:t>
-            </a:r>
-            <a:br/>
-            <a:br/>
-            <a:r>
-              <a:t>- Sets new record with 41.8 BLEU in English-to-French task.</a:t>
-            </a:r>
-            <a:br/>
-            <a:br/>
-            <a:r>
-              <a:t>- Requires significantly less training time on fewer GPUs.</a:t>
+              <a:t>- Outperforms RNNs, showing adaptability in parsing tasks.</a:t>
             </a:r>
           </a:p>
         </p:txBody>
@@ -3775,7 +3701,7 @@
               </a:defRPr>
             </a:pPr>
             <a:r>
-              <a:t>3. Efficient and rapid training process.</a:t>
+              <a:t>Adaptation to English constituency parsing challenges.</a:t>
             </a:r>
           </a:p>
         </p:txBody>
@@ -3811,22 +3737,27 @@
               </a:defRPr>
             </a:pPr>
             <a:r>
-              <a:t>- Transformer architecture streamlines training, outperforming prior models.</a:t>
+              <a:t>- Transformer adapted for English parsing.</a:t>
             </a:r>
             <a:br/>
             <a:br/>
             <a:r>
-              <a:t>- Achieves state-of-the-art BLEU scores in machine translation tasks.</a:t>
+              <a:t>- Trained on WSJ, 40K sentences.</a:t>
             </a:r>
             <a:br/>
             <a:br/>
             <a:r>
-              <a:t>- Adapts to English constituency parsing, showing versatility.</a:t>
+              <a:t>- Semi-supervised with 17M sentences.</a:t>
             </a:r>
             <a:br/>
             <a:br/>
             <a:r>
-              <a:t>- Trains rapidly on GPUs, reducing time and resource costs.</a:t>
+              <a:t>- Strong output structure; longer than input.</a:t>
+            </a:r>
+            <a:br/>
+            <a:br/>
+            <a:r>
+              <a:t>- Outperforms RNN in small-data regimes.</a:t>
             </a:r>
           </a:p>
         </p:txBody>
@@ -3840,6 +3771,120 @@
 </file>
 
 <file path=ppt/slides/slide7.xml><?xml version="1.0" encoding="utf-8"?>
+<p:sld xmlns:a="http://schemas.openxmlformats.org/drawingml/2006/main" xmlns:p="http://schemas.openxmlformats.org/presentationml/2006/main" xmlns:r="http://schemas.openxmlformats.org/officeDocument/2006/relationships">
+  <p:cSld>
+    <p:spTree>
+      <p:nvGrpSpPr>
+        <p:cNvPr id="1" name=""/>
+        <p:cNvGrpSpPr/>
+        <p:nvPr/>
+      </p:nvGrpSpPr>
+      <p:grpSpPr/>
+      <p:pic>
+        <p:nvPicPr>
+          <p:cNvPr id="2" name="Picture 1" descr="bg2.png"/>
+          <p:cNvPicPr>
+            <a:picLocks noChangeAspect="1"/>
+          </p:cNvPicPr>
+          <p:nvPr/>
+        </p:nvPicPr>
+        <p:blipFill>
+          <a:blip r:embed="rId2"/>
+          <a:stretch>
+            <a:fillRect/>
+          </a:stretch>
+        </p:blipFill>
+        <p:spPr>
+          <a:xfrm>
+            <a:off x="0" y="0"/>
+            <a:ext cx="9144000" cy="5144400"/>
+          </a:xfrm>
+          <a:prstGeom prst="rect">
+            <a:avLst/>
+          </a:prstGeom>
+        </p:spPr>
+      </p:pic>
+      <p:sp>
+        <p:nvSpPr>
+          <p:cNvPr id="3" name="TextBox 2"/>
+          <p:cNvSpPr txBox="1"/>
+          <p:nvPr/>
+        </p:nvSpPr>
+        <p:spPr>
+          <a:xfrm>
+            <a:off x="968400" y="550800"/>
+            <a:ext cx="6958799" cy="399600"/>
+          </a:xfrm>
+          <a:prstGeom prst="rect">
+            <a:avLst/>
+          </a:prstGeom>
+          <a:noFill/>
+        </p:spPr>
+        <p:txBody>
+          <a:bodyPr wrap="none" anchor="t">
+            <a:spAutoFit/>
+          </a:bodyPr>
+          <a:lstStyle/>
+          <a:p>
+            <a:pPr>
+              <a:defRPr b="1" sz="2000">
+                <a:solidFill>
+                  <a:srgbClr val="000000"/>
+                </a:solidFill>
+                <a:latin typeface="Calibri"/>
+              </a:defRPr>
+            </a:pPr>
+            <a:r>
+              <a:t>Conclusion</a:t>
+            </a:r>
+          </a:p>
+        </p:txBody>
+      </p:sp>
+      <p:sp>
+        <p:nvSpPr>
+          <p:cNvPr id="4" name="TextBox 3"/>
+          <p:cNvSpPr txBox="1"/>
+          <p:nvPr/>
+        </p:nvSpPr>
+        <p:spPr>
+          <a:xfrm>
+            <a:off x="4208400" y="1353600"/>
+            <a:ext cx="4287600" cy="3056400"/>
+          </a:xfrm>
+          <a:prstGeom prst="rect">
+            <a:avLst/>
+          </a:prstGeom>
+          <a:noFill/>
+        </p:spPr>
+        <p:txBody>
+          <a:bodyPr wrap="square" anchor="t">
+            <a:spAutoFit/>
+          </a:bodyPr>
+          <a:lstStyle/>
+          <a:p>
+            <a:pPr>
+              <a:defRPr sz="1200">
+                <a:solidFill>
+                  <a:srgbClr val="000000"/>
+                </a:solidFill>
+                <a:latin typeface="Calibri"/>
+              </a:defRPr>
+            </a:pPr>
+            <a:r>
+              <a:t>- In conclusion, the Transformer model represents a paradigm shift in sequence transduction, primarily in the field of machine translation. Its architecture, built exclusively on attention mechanisms, eliminates the need for recurrent processes, leading to more efficient training and superior handling of long-range dependencies. The model's exceptional performance is evidenced by its record-setting BLEU scores on the WMT 2014 English-to-German and English-to-French translation tasks, where it outperformed existing models, including ensembles, by a significant margin.</a:t>
+            </a:r>
+          </a:p>
+        </p:txBody>
+      </p:sp>
+    </p:spTree>
+  </p:cSld>
+  <p:clrMapOvr>
+    <a:masterClrMapping/>
+  </p:clrMapOvr>
+</p:sld>
+</file>
+
+<file path=ppt/slides/slide8.xml><?xml version="1.0" encoding="utf-8"?>
 <p:sld xmlns:a="http://schemas.openxmlformats.org/drawingml/2006/main" xmlns:p="http://schemas.openxmlformats.org/presentationml/2006/main" xmlns:r="http://schemas.openxmlformats.org/officeDocument/2006/relationships">
   <p:cSld>
     <p:spTree>
@@ -3903,9 +3948,6 @@
                 <a:latin typeface="Calibri"/>
               </a:defRPr>
             </a:pPr>
-            <a:r>
-              <a:t>4. Generalization across various machine learning tasks.</a:t>
-            </a:r>
           </a:p>
         </p:txBody>
       </p:sp>
@@ -3940,290 +3982,7 @@
               </a:defRPr>
             </a:pPr>
             <a:r>
-              <a:t>- Transformer excels in machine translation.</a:t>
-            </a:r>
-            <a:br/>
-            <a:br/>
-            <a:r>
-              <a:t>- Uses attention mechanisms; no recurrence/convolution.</a:t>
-            </a:r>
-            <a:br/>
-            <a:br/>
-            <a:r>
-              <a:t>- Adapts well to English constituency parsing.</a:t>
-            </a:r>
-            <a:br/>
-            <a:br/>
-            <a:r>
-              <a:t>- Efficient training processes for diverse tasks.</a:t>
-            </a:r>
-          </a:p>
-        </p:txBody>
-      </p:sp>
-    </p:spTree>
-  </p:cSld>
-  <p:clrMapOvr>
-    <a:masterClrMapping/>
-  </p:clrMapOvr>
-</p:sld>
-</file>
-
-<file path=ppt/slides/slide8.xml><?xml version="1.0" encoding="utf-8"?>
-<p:sld xmlns:a="http://schemas.openxmlformats.org/drawingml/2006/main" xmlns:p="http://schemas.openxmlformats.org/presentationml/2006/main" xmlns:r="http://schemas.openxmlformats.org/officeDocument/2006/relationships">
-  <p:cSld>
-    <p:spTree>
-      <p:nvGrpSpPr>
-        <p:cNvPr id="1" name=""/>
-        <p:cNvGrpSpPr/>
-        <p:nvPr/>
-      </p:nvGrpSpPr>
-      <p:grpSpPr/>
-      <p:pic>
-        <p:nvPicPr>
-          <p:cNvPr id="2" name="Picture 1" descr="bg3.png"/>
-          <p:cNvPicPr>
-            <a:picLocks noChangeAspect="1"/>
-          </p:cNvPicPr>
-          <p:nvPr/>
-        </p:nvPicPr>
-        <p:blipFill>
-          <a:blip r:embed="rId2"/>
-          <a:stretch>
-            <a:fillRect/>
-          </a:stretch>
-        </p:blipFill>
-        <p:spPr>
-          <a:xfrm>
-            <a:off x="0" y="0"/>
-            <a:ext cx="9144000" cy="5144400"/>
-          </a:xfrm>
-          <a:prstGeom prst="rect">
-            <a:avLst/>
-          </a:prstGeom>
-        </p:spPr>
-      </p:pic>
-      <p:sp>
-        <p:nvSpPr>
-          <p:cNvPr id="3" name="TextBox 2"/>
-          <p:cNvSpPr txBox="1"/>
-          <p:nvPr/>
-        </p:nvSpPr>
-        <p:spPr>
-          <a:xfrm>
-            <a:off x="968400" y="550800"/>
-            <a:ext cx="6958799" cy="399600"/>
-          </a:xfrm>
-          <a:prstGeom prst="rect">
-            <a:avLst/>
-          </a:prstGeom>
-          <a:noFill/>
-        </p:spPr>
-        <p:txBody>
-          <a:bodyPr wrap="none" anchor="t">
-            <a:spAutoFit/>
-          </a:bodyPr>
-          <a:lstStyle/>
-          <a:p>
-            <a:pPr>
-              <a:defRPr b="1" sz="2000">
-                <a:solidFill>
-                  <a:srgbClr val="000000"/>
-                </a:solidFill>
-                <a:latin typeface="Calibri"/>
-              </a:defRPr>
-            </a:pPr>
-            <a:r>
-              <a:t>5. Cost-effectiveness in training and research applicability.</a:t>
-            </a:r>
-          </a:p>
-        </p:txBody>
-      </p:sp>
-      <p:sp>
-        <p:nvSpPr>
-          <p:cNvPr id="4" name="TextBox 3"/>
-          <p:cNvSpPr txBox="1"/>
-          <p:nvPr/>
-        </p:nvSpPr>
-        <p:spPr>
-          <a:xfrm>
-            <a:off x="4208400" y="1353600"/>
-            <a:ext cx="4287600" cy="3056400"/>
-          </a:xfrm>
-          <a:prstGeom prst="rect">
-            <a:avLst/>
-          </a:prstGeom>
-          <a:noFill/>
-        </p:spPr>
-        <p:txBody>
-          <a:bodyPr wrap="square" anchor="t">
-            <a:spAutoFit/>
-          </a:bodyPr>
-          <a:lstStyle/>
-          <a:p>
-            <a:pPr>
-              <a:defRPr sz="1200">
-                <a:solidFill>
-                  <a:srgbClr val="000000"/>
-                </a:solidFill>
-                <a:latin typeface="Calibri"/>
-              </a:defRPr>
-            </a:pPr>
-            <a:r>
-              <a:t>- Transformer architecture reduces training time.</a:t>
-            </a:r>
-            <a:br/>
-            <a:br/>
-            <a:r>
-              <a:t>- Achieves state-of-the-art results on translation tasks.</a:t>
-            </a:r>
-            <a:br/>
-            <a:br/>
-            <a:r>
-              <a:t>- Adaptable to English constituency parsing.</a:t>
-            </a:r>
-            <a:br/>
-            <a:br/>
-            <a:r>
-              <a:t>- Efficient training on standard and semi-supervised datasets.</a:t>
-            </a:r>
-            <a:br/>
-            <a:br/>
-            <a:r>
-              <a:t>- Cost-effective due to less computational resource usage.</a:t>
-            </a:r>
-          </a:p>
-        </p:txBody>
-      </p:sp>
-    </p:spTree>
-  </p:cSld>
-  <p:clrMapOvr>
-    <a:masterClrMapping/>
-  </p:clrMapOvr>
-</p:sld>
-</file>
-
-<file path=ppt/slides/slide9.xml><?xml version="1.0" encoding="utf-8"?>
-<p:sld xmlns:a="http://schemas.openxmlformats.org/drawingml/2006/main" xmlns:p="http://schemas.openxmlformats.org/presentationml/2006/main" xmlns:r="http://schemas.openxmlformats.org/officeDocument/2006/relationships">
-  <p:cSld>
-    <p:spTree>
-      <p:nvGrpSpPr>
-        <p:cNvPr id="1" name=""/>
-        <p:cNvGrpSpPr/>
-        <p:nvPr/>
-      </p:nvGrpSpPr>
-      <p:grpSpPr/>
-      <p:pic>
-        <p:nvPicPr>
-          <p:cNvPr id="2" name="Picture 1" descr="bg3.png"/>
-          <p:cNvPicPr>
-            <a:picLocks noChangeAspect="1"/>
-          </p:cNvPicPr>
-          <p:nvPr/>
-        </p:nvPicPr>
-        <p:blipFill>
-          <a:blip r:embed="rId2"/>
-          <a:stretch>
-            <a:fillRect/>
-          </a:stretch>
-        </p:blipFill>
-        <p:spPr>
-          <a:xfrm>
-            <a:off x="0" y="0"/>
-            <a:ext cx="9144000" cy="5144400"/>
-          </a:xfrm>
-          <a:prstGeom prst="rect">
-            <a:avLst/>
-          </a:prstGeom>
-        </p:spPr>
-      </p:pic>
-      <p:sp>
-        <p:nvSpPr>
-          <p:cNvPr id="3" name="TextBox 2"/>
-          <p:cNvSpPr txBox="1"/>
-          <p:nvPr/>
-        </p:nvSpPr>
-        <p:spPr>
-          <a:xfrm>
-            <a:off x="968400" y="550800"/>
-            <a:ext cx="6958799" cy="399600"/>
-          </a:xfrm>
-          <a:prstGeom prst="rect">
-            <a:avLst/>
-          </a:prstGeom>
-          <a:noFill/>
-        </p:spPr>
-        <p:txBody>
-          <a:bodyPr wrap="none" anchor="t">
-            <a:spAutoFit/>
-          </a:bodyPr>
-          <a:lstStyle/>
-          <a:p>
-            <a:pPr>
-              <a:defRPr b="1" sz="2000">
-                <a:solidFill>
-                  <a:srgbClr val="000000"/>
-                </a:solidFill>
-                <a:latin typeface="Calibri"/>
-              </a:defRPr>
-            </a:pPr>
-            <a:r>
-              <a:t>Conclusion</a:t>
-            </a:r>
-          </a:p>
-        </p:txBody>
-      </p:sp>
-      <p:sp>
-        <p:nvSpPr>
-          <p:cNvPr id="4" name="TextBox 3"/>
-          <p:cNvSpPr txBox="1"/>
-          <p:nvPr/>
-        </p:nvSpPr>
-        <p:spPr>
-          <a:xfrm>
-            <a:off x="4208400" y="1353600"/>
-            <a:ext cx="4287600" cy="3056400"/>
-          </a:xfrm>
-          <a:prstGeom prst="rect">
-            <a:avLst/>
-          </a:prstGeom>
-          <a:noFill/>
-        </p:spPr>
-        <p:txBody>
-          <a:bodyPr wrap="square" anchor="t">
-            <a:spAutoFit/>
-          </a:bodyPr>
-          <a:lstStyle/>
-          <a:p>
-            <a:pPr>
-              <a:defRPr sz="1200">
-                <a:solidFill>
-                  <a:srgbClr val="000000"/>
-                </a:solidFill>
-                <a:latin typeface="Calibri"/>
-              </a:defRPr>
-            </a:pPr>
-            <a:r>
-              <a:t>- In conclusion, the Transformer architecture represents a significant advancement in the field of sequence transduction, moving away from the traditional reliance on recurrent or convolutional neural networks. By fully embracing attention mechanisms, the Transformer offers a more streamlined and efficient approach to machine learning tasks.</a:t>
-            </a:r>
-            <a:br/>
-            <a:br/>
-            <a:r>
-              <a:t>- Its exceptional performance in machine translation, particularly in the WMT 2014 English-to-German and English-to-French tasks, has set new benchmarks for the field. The Transformer's ability to outperform ensemble models while requiring fewer training resources is a clear indication of its superior design.</a:t>
-            </a:r>
-            <a:br/>
-            <a:br/>
-            <a:r>
-              <a:t>- The training process of the Transformer is notably efficient, leveraging its parallelizable nature to reduce training times dramatically. This efficiency is not just a theoretical advantage but has been empirically demonstrated in its rapid achievement of a 41.8 BLEU score on the English-to-French translation task with minimal computational expense.</a:t>
-            </a:r>
-            <a:br/>
-            <a:br/>
-            <a:r>
-              <a:t>- Beyond machine translation, the Transformer's design principles have proven to be broadly applicable, showing great promise in generalizing to a variety of other machine learning tasks. This adaptability underscores the transformative potential of the architecture across the broader landscape of artificial intelligence research.</a:t>
-            </a:r>
-            <a:br/>
-            <a:br/>
-            <a:r>
-              <a:t>- The cost-effectiveness and reduced training duration of the Transformer do not only benefit the research community in terms of resource allocation but also pave the way for more sustainable and scalable machine learning solutions, making advanced AI more accessible and practical for real-world applications.</a:t>
+              <a:t>- The model's versatility extends beyond machine translation, as demonstrated by its successful application to English constituency parsing. The challenges of this task, with its complex structural demands and longer output sequences, were met by the Transformer's robust architecture. Trained on the Wall Street Journal corpus of the Penn Treebank and further refined through semi-supervised learning with an expanded vocabulary, the Transformer showcased its remarkable ability to generalize across different linguistic tasks. This adaptability not only confirms the Transformer's potential in advancing machine learning in the realm of complex language processing but also sets a new standard for future research in natural language understanding and beyond.</a:t>
             </a:r>
           </a:p>
         </p:txBody>

</xml_diff>

<commit_message>
refine the markdown generator prompt
</commit_message>
<xml_diff>
--- a/ppt_generator/my_ppts/attention_mode1.pptx
+++ b/ppt_generator/my_ppts/attention_mode1.pptx
@@ -5,15 +5,18 @@
     <p:sldMasterId id="2147483648" r:id="rId1"/>
   </p:sldMasterIdLst>
   <p:sldIdLst>
-    <p:sldId id="256" r:id="rId7"/>
-    <p:sldId id="257" r:id="rId8"/>
-    <p:sldId id="258" r:id="rId9"/>
-    <p:sldId id="259" r:id="rId10"/>
-    <p:sldId id="260" r:id="rId11"/>
-    <p:sldId id="261" r:id="rId12"/>
-    <p:sldId id="262" r:id="rId13"/>
+    <p:sldId id="256" r:id="rId2"/>
+    <p:sldId id="257" r:id="rId3"/>
+    <p:sldId id="258" r:id="rId4"/>
+    <p:sldId id="259" r:id="rId5"/>
+    <p:sldId id="260" r:id="rId6"/>
+    <p:sldId id="261" r:id="rId7"/>
+    <p:sldId id="262" r:id="rId8"/>
+    <p:sldId id="263" r:id="rId9"/>
+    <p:sldId id="264" r:id="rId10"/>
+    <p:sldId id="265" r:id="rId11"/>
   </p:sldIdLst>
-  <p:sldSz cx="9144000" cy="5144400" type="screen4x3"/>
+  <p:sldSz cx="9144000" cy="5145088"/>
   <p:notesSz cx="6858000" cy="9144000"/>
   <p:defaultTextStyle>
     <a:defPPr>
@@ -110,6 +113,22 @@
       </a:defRPr>
     </a:lvl9pPr>
   </p:defaultTextStyle>
+  <p:extLst>
+    <p:ext uri="{EFAFB233-063F-42B5-8137-9DF3F51BA10A}">
+      <p15:sldGuideLst xmlns:p15="http://schemas.microsoft.com/office/powerpoint/2012/main">
+        <p15:guide id="1" orient="horz" pos="2160">
+          <p15:clr>
+            <a:srgbClr val="A4A3A4"/>
+          </p15:clr>
+        </p15:guide>
+        <p15:guide id="2" pos="2880">
+          <p15:clr>
+            <a:srgbClr val="A4A3A4"/>
+          </p15:clr>
+        </p15:guide>
+      </p15:sldGuideLst>
+    </p:ext>
+  </p:extLst>
 </p:presentation>
 </file>
 
@@ -151,10 +170,9 @@
           <a:lstStyle/>
           <a:p>
             <a:r>
-              <a:rPr lang="en-US" smtClean="0"/>
+              <a:rPr lang="en-US"/>
               <a:t>Click to edit Master title style</a:t>
             </a:r>
-            <a:endParaRPr lang="en-US"/>
           </a:p>
         </p:txBody>
       </p:sp>
@@ -270,10 +288,9 @@
           </a:lstStyle>
           <a:p>
             <a:r>
-              <a:rPr lang="en-US" smtClean="0"/>
+              <a:rPr lang="en-US"/>
               <a:t>Click to edit Master subtitle style</a:t>
             </a:r>
-            <a:endParaRPr lang="en-US"/>
           </a:p>
         </p:txBody>
       </p:sp>
@@ -294,7 +311,7 @@
           <a:p>
             <a:fld id="{5BCAD085-E8A6-8845-BD4E-CB4CCA059FC4}" type="datetimeFigureOut">
               <a:rPr lang="en-US" smtClean="0"/>
-              <a:t>1/27/13</a:t>
+              <a:t>4/15/24</a:t>
             </a:fld>
             <a:endParaRPr lang="en-US"/>
           </a:p>
@@ -388,10 +405,9 @@
           <a:lstStyle/>
           <a:p>
             <a:r>
-              <a:rPr lang="en-US" smtClean="0"/>
+              <a:rPr lang="en-US"/>
               <a:t>Click to edit Master title style</a:t>
             </a:r>
-            <a:endParaRPr lang="en-US"/>
           </a:p>
         </p:txBody>
       </p:sp>
@@ -412,38 +428,37 @@
           <a:p>
             <a:pPr lvl="0"/>
             <a:r>
-              <a:rPr lang="en-US" smtClean="0"/>
+              <a:rPr lang="en-US"/>
               <a:t>Click to edit Master text styles</a:t>
             </a:r>
           </a:p>
           <a:p>
             <a:pPr lvl="1"/>
             <a:r>
-              <a:rPr lang="en-US" smtClean="0"/>
+              <a:rPr lang="en-US"/>
               <a:t>Second level</a:t>
             </a:r>
           </a:p>
           <a:p>
             <a:pPr lvl="2"/>
             <a:r>
-              <a:rPr lang="en-US" smtClean="0"/>
+              <a:rPr lang="en-US"/>
               <a:t>Third level</a:t>
             </a:r>
           </a:p>
           <a:p>
             <a:pPr lvl="3"/>
             <a:r>
-              <a:rPr lang="en-US" smtClean="0"/>
+              <a:rPr lang="en-US"/>
               <a:t>Fourth level</a:t>
             </a:r>
           </a:p>
           <a:p>
             <a:pPr lvl="4"/>
             <a:r>
-              <a:rPr lang="en-US" smtClean="0"/>
+              <a:rPr lang="en-US"/>
               <a:t>Fifth level</a:t>
             </a:r>
-            <a:endParaRPr lang="en-US"/>
           </a:p>
         </p:txBody>
       </p:sp>
@@ -464,7 +479,7 @@
           <a:p>
             <a:fld id="{5BCAD085-E8A6-8845-BD4E-CB4CCA059FC4}" type="datetimeFigureOut">
               <a:rPr lang="en-US" smtClean="0"/>
-              <a:t>1/27/13</a:t>
+              <a:t>4/15/24</a:t>
             </a:fld>
             <a:endParaRPr lang="en-US"/>
           </a:p>
@@ -563,10 +578,9 @@
           <a:lstStyle/>
           <a:p>
             <a:r>
-              <a:rPr lang="en-US" smtClean="0"/>
+              <a:rPr lang="en-US"/>
               <a:t>Click to edit Master title style</a:t>
             </a:r>
-            <a:endParaRPr lang="en-US"/>
           </a:p>
         </p:txBody>
       </p:sp>
@@ -592,38 +606,37 @@
           <a:p>
             <a:pPr lvl="0"/>
             <a:r>
-              <a:rPr lang="en-US" smtClean="0"/>
+              <a:rPr lang="en-US"/>
               <a:t>Click to edit Master text styles</a:t>
             </a:r>
           </a:p>
           <a:p>
             <a:pPr lvl="1"/>
             <a:r>
-              <a:rPr lang="en-US" smtClean="0"/>
+              <a:rPr lang="en-US"/>
               <a:t>Second level</a:t>
             </a:r>
           </a:p>
           <a:p>
             <a:pPr lvl="2"/>
             <a:r>
-              <a:rPr lang="en-US" smtClean="0"/>
+              <a:rPr lang="en-US"/>
               <a:t>Third level</a:t>
             </a:r>
           </a:p>
           <a:p>
             <a:pPr lvl="3"/>
             <a:r>
-              <a:rPr lang="en-US" smtClean="0"/>
+              <a:rPr lang="en-US"/>
               <a:t>Fourth level</a:t>
             </a:r>
           </a:p>
           <a:p>
             <a:pPr lvl="4"/>
             <a:r>
-              <a:rPr lang="en-US" smtClean="0"/>
+              <a:rPr lang="en-US"/>
               <a:t>Fifth level</a:t>
             </a:r>
-            <a:endParaRPr lang="en-US"/>
           </a:p>
         </p:txBody>
       </p:sp>
@@ -644,7 +657,7 @@
           <a:p>
             <a:fld id="{5BCAD085-E8A6-8845-BD4E-CB4CCA059FC4}" type="datetimeFigureOut">
               <a:rPr lang="en-US" smtClean="0"/>
-              <a:t>1/27/13</a:t>
+              <a:t>4/15/24</a:t>
             </a:fld>
             <a:endParaRPr lang="en-US"/>
           </a:p>
@@ -738,10 +751,9 @@
           <a:lstStyle/>
           <a:p>
             <a:r>
-              <a:rPr lang="en-US" smtClean="0"/>
+              <a:rPr lang="en-US"/>
               <a:t>Click to edit Master title style</a:t>
             </a:r>
-            <a:endParaRPr lang="en-US"/>
           </a:p>
         </p:txBody>
       </p:sp>
@@ -762,38 +774,37 @@
           <a:p>
             <a:pPr lvl="0"/>
             <a:r>
-              <a:rPr lang="en-US" smtClean="0"/>
+              <a:rPr lang="en-US"/>
               <a:t>Click to edit Master text styles</a:t>
             </a:r>
           </a:p>
           <a:p>
             <a:pPr lvl="1"/>
             <a:r>
-              <a:rPr lang="en-US" smtClean="0"/>
+              <a:rPr lang="en-US"/>
               <a:t>Second level</a:t>
             </a:r>
           </a:p>
           <a:p>
             <a:pPr lvl="2"/>
             <a:r>
-              <a:rPr lang="en-US" smtClean="0"/>
+              <a:rPr lang="en-US"/>
               <a:t>Third level</a:t>
             </a:r>
           </a:p>
           <a:p>
             <a:pPr lvl="3"/>
             <a:r>
-              <a:rPr lang="en-US" smtClean="0"/>
+              <a:rPr lang="en-US"/>
               <a:t>Fourth level</a:t>
             </a:r>
           </a:p>
           <a:p>
             <a:pPr lvl="4"/>
             <a:r>
-              <a:rPr lang="en-US" smtClean="0"/>
+              <a:rPr lang="en-US"/>
               <a:t>Fifth level</a:t>
             </a:r>
-            <a:endParaRPr lang="en-US"/>
           </a:p>
         </p:txBody>
       </p:sp>
@@ -814,7 +825,7 @@
           <a:p>
             <a:fld id="{5BCAD085-E8A6-8845-BD4E-CB4CCA059FC4}" type="datetimeFigureOut">
               <a:rPr lang="en-US" smtClean="0"/>
-              <a:t>1/27/13</a:t>
+              <a:t>4/15/24</a:t>
             </a:fld>
             <a:endParaRPr lang="en-US"/>
           </a:p>
@@ -917,10 +928,9 @@
           </a:lstStyle>
           <a:p>
             <a:r>
-              <a:rPr lang="en-US" smtClean="0"/>
+              <a:rPr lang="en-US"/>
               <a:t>Click to edit Master title style</a:t>
             </a:r>
-            <a:endParaRPr lang="en-US"/>
           </a:p>
         </p:txBody>
       </p:sp>
@@ -1037,7 +1047,7 @@
           <a:p>
             <a:pPr lvl="0"/>
             <a:r>
-              <a:rPr lang="en-US" smtClean="0"/>
+              <a:rPr lang="en-US"/>
               <a:t>Click to edit Master text styles</a:t>
             </a:r>
           </a:p>
@@ -1060,7 +1070,7 @@
           <a:p>
             <a:fld id="{5BCAD085-E8A6-8845-BD4E-CB4CCA059FC4}" type="datetimeFigureOut">
               <a:rPr lang="en-US" smtClean="0"/>
-              <a:t>1/27/13</a:t>
+              <a:t>4/15/24</a:t>
             </a:fld>
             <a:endParaRPr lang="en-US"/>
           </a:p>
@@ -1154,10 +1164,9 @@
           <a:lstStyle/>
           <a:p>
             <a:r>
-              <a:rPr lang="en-US" smtClean="0"/>
+              <a:rPr lang="en-US"/>
               <a:t>Click to edit Master title style</a:t>
             </a:r>
-            <a:endParaRPr lang="en-US"/>
           </a:p>
         </p:txBody>
       </p:sp>
@@ -1211,38 +1220,37 @@
           <a:p>
             <a:pPr lvl="0"/>
             <a:r>
-              <a:rPr lang="en-US" smtClean="0"/>
+              <a:rPr lang="en-US"/>
               <a:t>Click to edit Master text styles</a:t>
             </a:r>
           </a:p>
           <a:p>
             <a:pPr lvl="1"/>
             <a:r>
-              <a:rPr lang="en-US" smtClean="0"/>
+              <a:rPr lang="en-US"/>
               <a:t>Second level</a:t>
             </a:r>
           </a:p>
           <a:p>
             <a:pPr lvl="2"/>
             <a:r>
-              <a:rPr lang="en-US" smtClean="0"/>
+              <a:rPr lang="en-US"/>
               <a:t>Third level</a:t>
             </a:r>
           </a:p>
           <a:p>
             <a:pPr lvl="3"/>
             <a:r>
-              <a:rPr lang="en-US" smtClean="0"/>
+              <a:rPr lang="en-US"/>
               <a:t>Fourth level</a:t>
             </a:r>
           </a:p>
           <a:p>
             <a:pPr lvl="4"/>
             <a:r>
-              <a:rPr lang="en-US" smtClean="0"/>
+              <a:rPr lang="en-US"/>
               <a:t>Fifth level</a:t>
             </a:r>
-            <a:endParaRPr lang="en-US"/>
           </a:p>
         </p:txBody>
       </p:sp>
@@ -1296,38 +1304,37 @@
           <a:p>
             <a:pPr lvl="0"/>
             <a:r>
-              <a:rPr lang="en-US" smtClean="0"/>
+              <a:rPr lang="en-US"/>
               <a:t>Click to edit Master text styles</a:t>
             </a:r>
           </a:p>
           <a:p>
             <a:pPr lvl="1"/>
             <a:r>
-              <a:rPr lang="en-US" smtClean="0"/>
+              <a:rPr lang="en-US"/>
               <a:t>Second level</a:t>
             </a:r>
           </a:p>
           <a:p>
             <a:pPr lvl="2"/>
             <a:r>
-              <a:rPr lang="en-US" smtClean="0"/>
+              <a:rPr lang="en-US"/>
               <a:t>Third level</a:t>
             </a:r>
           </a:p>
           <a:p>
             <a:pPr lvl="3"/>
             <a:r>
-              <a:rPr lang="en-US" smtClean="0"/>
+              <a:rPr lang="en-US"/>
               <a:t>Fourth level</a:t>
             </a:r>
           </a:p>
           <a:p>
             <a:pPr lvl="4"/>
             <a:r>
-              <a:rPr lang="en-US" smtClean="0"/>
+              <a:rPr lang="en-US"/>
               <a:t>Fifth level</a:t>
             </a:r>
-            <a:endParaRPr lang="en-US"/>
           </a:p>
         </p:txBody>
       </p:sp>
@@ -1348,7 +1355,7 @@
           <a:p>
             <a:fld id="{5BCAD085-E8A6-8845-BD4E-CB4CCA059FC4}" type="datetimeFigureOut">
               <a:rPr lang="en-US" smtClean="0"/>
-              <a:t>1/27/13</a:t>
+              <a:t>4/15/24</a:t>
             </a:fld>
             <a:endParaRPr lang="en-US"/>
           </a:p>
@@ -1446,10 +1453,9 @@
           </a:lstStyle>
           <a:p>
             <a:r>
-              <a:rPr lang="en-US" smtClean="0"/>
+              <a:rPr lang="en-US"/>
               <a:t>Click to edit Master title style</a:t>
             </a:r>
-            <a:endParaRPr lang="en-US"/>
           </a:p>
         </p:txBody>
       </p:sp>
@@ -1512,7 +1518,7 @@
           <a:p>
             <a:pPr lvl="0"/>
             <a:r>
-              <a:rPr lang="en-US" smtClean="0"/>
+              <a:rPr lang="en-US"/>
               <a:t>Click to edit Master text styles</a:t>
             </a:r>
           </a:p>
@@ -1568,38 +1574,37 @@
           <a:p>
             <a:pPr lvl="0"/>
             <a:r>
-              <a:rPr lang="en-US" smtClean="0"/>
+              <a:rPr lang="en-US"/>
               <a:t>Click to edit Master text styles</a:t>
             </a:r>
           </a:p>
           <a:p>
             <a:pPr lvl="1"/>
             <a:r>
-              <a:rPr lang="en-US" smtClean="0"/>
+              <a:rPr lang="en-US"/>
               <a:t>Second level</a:t>
             </a:r>
           </a:p>
           <a:p>
             <a:pPr lvl="2"/>
             <a:r>
-              <a:rPr lang="en-US" smtClean="0"/>
+              <a:rPr lang="en-US"/>
               <a:t>Third level</a:t>
             </a:r>
           </a:p>
           <a:p>
             <a:pPr lvl="3"/>
             <a:r>
-              <a:rPr lang="en-US" smtClean="0"/>
+              <a:rPr lang="en-US"/>
               <a:t>Fourth level</a:t>
             </a:r>
           </a:p>
           <a:p>
             <a:pPr lvl="4"/>
             <a:r>
-              <a:rPr lang="en-US" smtClean="0"/>
+              <a:rPr lang="en-US"/>
               <a:t>Fifth level</a:t>
             </a:r>
-            <a:endParaRPr lang="en-US"/>
           </a:p>
         </p:txBody>
       </p:sp>
@@ -1662,7 +1667,7 @@
           <a:p>
             <a:pPr lvl="0"/>
             <a:r>
-              <a:rPr lang="en-US" smtClean="0"/>
+              <a:rPr lang="en-US"/>
               <a:t>Click to edit Master text styles</a:t>
             </a:r>
           </a:p>
@@ -1718,38 +1723,37 @@
           <a:p>
             <a:pPr lvl="0"/>
             <a:r>
-              <a:rPr lang="en-US" smtClean="0"/>
+              <a:rPr lang="en-US"/>
               <a:t>Click to edit Master text styles</a:t>
             </a:r>
           </a:p>
           <a:p>
             <a:pPr lvl="1"/>
             <a:r>
-              <a:rPr lang="en-US" smtClean="0"/>
+              <a:rPr lang="en-US"/>
               <a:t>Second level</a:t>
             </a:r>
           </a:p>
           <a:p>
             <a:pPr lvl="2"/>
             <a:r>
-              <a:rPr lang="en-US" smtClean="0"/>
+              <a:rPr lang="en-US"/>
               <a:t>Third level</a:t>
             </a:r>
           </a:p>
           <a:p>
             <a:pPr lvl="3"/>
             <a:r>
-              <a:rPr lang="en-US" smtClean="0"/>
+              <a:rPr lang="en-US"/>
               <a:t>Fourth level</a:t>
             </a:r>
           </a:p>
           <a:p>
             <a:pPr lvl="4"/>
             <a:r>
-              <a:rPr lang="en-US" smtClean="0"/>
+              <a:rPr lang="en-US"/>
               <a:t>Fifth level</a:t>
             </a:r>
-            <a:endParaRPr lang="en-US"/>
           </a:p>
         </p:txBody>
       </p:sp>
@@ -1770,7 +1774,7 @@
           <a:p>
             <a:fld id="{5BCAD085-E8A6-8845-BD4E-CB4CCA059FC4}" type="datetimeFigureOut">
               <a:rPr lang="en-US" smtClean="0"/>
-              <a:t>1/27/13</a:t>
+              <a:t>4/15/24</a:t>
             </a:fld>
             <a:endParaRPr lang="en-US"/>
           </a:p>
@@ -1864,10 +1868,9 @@
           <a:lstStyle/>
           <a:p>
             <a:r>
-              <a:rPr lang="en-US" smtClean="0"/>
+              <a:rPr lang="en-US"/>
               <a:t>Click to edit Master title style</a:t>
             </a:r>
-            <a:endParaRPr lang="en-US"/>
           </a:p>
         </p:txBody>
       </p:sp>
@@ -1888,7 +1891,7 @@
           <a:p>
             <a:fld id="{5BCAD085-E8A6-8845-BD4E-CB4CCA059FC4}" type="datetimeFigureOut">
               <a:rPr lang="en-US" smtClean="0"/>
-              <a:t>1/27/13</a:t>
+              <a:t>4/15/24</a:t>
             </a:fld>
             <a:endParaRPr lang="en-US"/>
           </a:p>
@@ -1983,7 +1986,7 @@
           <a:p>
             <a:fld id="{5BCAD085-E8A6-8845-BD4E-CB4CCA059FC4}" type="datetimeFigureOut">
               <a:rPr lang="en-US" smtClean="0"/>
-              <a:t>1/27/13</a:t>
+              <a:t>4/15/24</a:t>
             </a:fld>
             <a:endParaRPr lang="en-US"/>
           </a:p>
@@ -2086,10 +2089,9 @@
           </a:lstStyle>
           <a:p>
             <a:r>
-              <a:rPr lang="en-US" smtClean="0"/>
+              <a:rPr lang="en-US"/>
               <a:t>Click to edit Master title style</a:t>
             </a:r>
-            <a:endParaRPr lang="en-US"/>
           </a:p>
         </p:txBody>
       </p:sp>
@@ -2143,38 +2145,37 @@
           <a:p>
             <a:pPr lvl="0"/>
             <a:r>
-              <a:rPr lang="en-US" smtClean="0"/>
+              <a:rPr lang="en-US"/>
               <a:t>Click to edit Master text styles</a:t>
             </a:r>
           </a:p>
           <a:p>
             <a:pPr lvl="1"/>
             <a:r>
-              <a:rPr lang="en-US" smtClean="0"/>
+              <a:rPr lang="en-US"/>
               <a:t>Second level</a:t>
             </a:r>
           </a:p>
           <a:p>
             <a:pPr lvl="2"/>
             <a:r>
-              <a:rPr lang="en-US" smtClean="0"/>
+              <a:rPr lang="en-US"/>
               <a:t>Third level</a:t>
             </a:r>
           </a:p>
           <a:p>
             <a:pPr lvl="3"/>
             <a:r>
-              <a:rPr lang="en-US" smtClean="0"/>
+              <a:rPr lang="en-US"/>
               <a:t>Fourth level</a:t>
             </a:r>
           </a:p>
           <a:p>
             <a:pPr lvl="4"/>
             <a:r>
-              <a:rPr lang="en-US" smtClean="0"/>
+              <a:rPr lang="en-US"/>
               <a:t>Fifth level</a:t>
             </a:r>
-            <a:endParaRPr lang="en-US"/>
           </a:p>
         </p:txBody>
       </p:sp>
@@ -2237,7 +2238,7 @@
           <a:p>
             <a:pPr lvl="0"/>
             <a:r>
-              <a:rPr lang="en-US" smtClean="0"/>
+              <a:rPr lang="en-US"/>
               <a:t>Click to edit Master text styles</a:t>
             </a:r>
           </a:p>
@@ -2260,7 +2261,7 @@
           <a:p>
             <a:fld id="{5BCAD085-E8A6-8845-BD4E-CB4CCA059FC4}" type="datetimeFigureOut">
               <a:rPr lang="en-US" smtClean="0"/>
-              <a:t>1/27/13</a:t>
+              <a:t>4/15/24</a:t>
             </a:fld>
             <a:endParaRPr lang="en-US"/>
           </a:p>
@@ -2363,10 +2364,9 @@
           </a:lstStyle>
           <a:p>
             <a:r>
-              <a:rPr lang="en-US" smtClean="0"/>
+              <a:rPr lang="en-US"/>
               <a:t>Click to edit Master title style</a:t>
             </a:r>
-            <a:endParaRPr lang="en-US"/>
           </a:p>
         </p:txBody>
       </p:sp>
@@ -2490,7 +2490,7 @@
           <a:p>
             <a:pPr lvl="0"/>
             <a:r>
-              <a:rPr lang="en-US" smtClean="0"/>
+              <a:rPr lang="en-US"/>
               <a:t>Click to edit Master text styles</a:t>
             </a:r>
           </a:p>
@@ -2513,7 +2513,7 @@
           <a:p>
             <a:fld id="{5BCAD085-E8A6-8845-BD4E-CB4CCA059FC4}" type="datetimeFigureOut">
               <a:rPr lang="en-US" smtClean="0"/>
-              <a:t>1/27/13</a:t>
+              <a:t>4/15/24</a:t>
             </a:fld>
             <a:endParaRPr lang="en-US"/>
           </a:p>
@@ -2622,10 +2622,9 @@
           <a:lstStyle/>
           <a:p>
             <a:r>
-              <a:rPr lang="en-US" smtClean="0"/>
+              <a:rPr lang="en-US"/>
               <a:t>Click to edit Master title style</a:t>
             </a:r>
-            <a:endParaRPr lang="en-US"/>
           </a:p>
         </p:txBody>
       </p:sp>
@@ -2656,38 +2655,37 @@
           <a:p>
             <a:pPr lvl="0"/>
             <a:r>
-              <a:rPr lang="en-US" smtClean="0"/>
+              <a:rPr lang="en-US"/>
               <a:t>Click to edit Master text styles</a:t>
             </a:r>
           </a:p>
           <a:p>
             <a:pPr lvl="1"/>
             <a:r>
-              <a:rPr lang="en-US" smtClean="0"/>
+              <a:rPr lang="en-US"/>
               <a:t>Second level</a:t>
             </a:r>
           </a:p>
           <a:p>
             <a:pPr lvl="2"/>
             <a:r>
-              <a:rPr lang="en-US" smtClean="0"/>
+              <a:rPr lang="en-US"/>
               <a:t>Third level</a:t>
             </a:r>
           </a:p>
           <a:p>
             <a:pPr lvl="3"/>
             <a:r>
-              <a:rPr lang="en-US" smtClean="0"/>
+              <a:rPr lang="en-US"/>
               <a:t>Fourth level</a:t>
             </a:r>
           </a:p>
           <a:p>
             <a:pPr lvl="4"/>
             <a:r>
-              <a:rPr lang="en-US" smtClean="0"/>
+              <a:rPr lang="en-US"/>
               <a:t>Fifth level</a:t>
             </a:r>
-            <a:endParaRPr lang="en-US"/>
           </a:p>
         </p:txBody>
       </p:sp>
@@ -2726,7 +2724,7 @@
           <a:p>
             <a:fld id="{5BCAD085-E8A6-8845-BD4E-CB4CCA059FC4}" type="datetimeFigureOut">
               <a:rPr lang="en-US" smtClean="0"/>
-              <a:t>1/27/13</a:t>
+              <a:t>4/15/24</a:t>
             </a:fld>
             <a:endParaRPr lang="en-US"/>
           </a:p>
@@ -3085,7 +3083,7 @@
 </file>
 
 <file path=ppt/slides/slide1.xml><?xml version="1.0" encoding="utf-8"?>
-<p:sld xmlns:a="http://schemas.openxmlformats.org/drawingml/2006/main" xmlns:p="http://schemas.openxmlformats.org/presentationml/2006/main" xmlns:r="http://schemas.openxmlformats.org/officeDocument/2006/relationships">
+<p:sld xmlns:a="http://schemas.openxmlformats.org/drawingml/2006/main" xmlns:r="http://schemas.openxmlformats.org/officeDocument/2006/relationships" xmlns:p="http://schemas.openxmlformats.org/presentationml/2006/main">
   <p:cSld>
     <p:spTree>
       <p:nvGrpSpPr>
@@ -3093,7 +3091,14 @@
         <p:cNvGrpSpPr/>
         <p:nvPr/>
       </p:nvGrpSpPr>
-      <p:grpSpPr/>
+      <p:grpSpPr>
+        <a:xfrm>
+          <a:off x="0" y="0"/>
+          <a:ext cx="0" cy="0"/>
+          <a:chOff x="0" y="0"/>
+          <a:chExt cx="0" cy="0"/>
+        </a:xfrm>
+      </p:grpSpPr>
       <p:pic>
         <p:nvPicPr>
           <p:cNvPr id="2" name="Picture 1" descr="title.png"/>
@@ -3149,7 +3154,143 @@
               </a:defRPr>
             </a:pPr>
             <a:r>
-              <a:t>"Transformer Network: Superior Translation, Attention Mechanism, and Efficient Training"</a:t>
+              <a:t>"Transformer: Revolutionizing Machine Translation and Parsing with Attention Mechanisms"</a:t>
+            </a:r>
+          </a:p>
+        </p:txBody>
+      </p:sp>
+    </p:spTree>
+  </p:cSld>
+  <p:clrMapOvr>
+    <a:masterClrMapping/>
+  </p:clrMapOvr>
+</p:sld>
+</file>
+
+<file path=ppt/slides/slide10.xml><?xml version="1.0" encoding="utf-8"?>
+<p:sld xmlns:a="http://schemas.openxmlformats.org/drawingml/2006/main" xmlns:r="http://schemas.openxmlformats.org/officeDocument/2006/relationships" xmlns:p="http://schemas.openxmlformats.org/presentationml/2006/main">
+  <p:cSld>
+    <p:spTree>
+      <p:nvGrpSpPr>
+        <p:cNvPr id="1" name=""/>
+        <p:cNvGrpSpPr/>
+        <p:nvPr/>
+      </p:nvGrpSpPr>
+      <p:grpSpPr>
+        <a:xfrm>
+          <a:off x="0" y="0"/>
+          <a:ext cx="0" cy="0"/>
+          <a:chOff x="0" y="0"/>
+          <a:chExt cx="0" cy="0"/>
+        </a:xfrm>
+      </p:grpSpPr>
+      <p:pic>
+        <p:nvPicPr>
+          <p:cNvPr id="2" name="Picture 1" descr="bg1.png"/>
+          <p:cNvPicPr>
+            <a:picLocks noChangeAspect="1"/>
+          </p:cNvPicPr>
+          <p:nvPr/>
+        </p:nvPicPr>
+        <p:blipFill>
+          <a:blip r:embed="rId2"/>
+          <a:stretch>
+            <a:fillRect/>
+          </a:stretch>
+        </p:blipFill>
+        <p:spPr>
+          <a:xfrm>
+            <a:off x="0" y="0"/>
+            <a:ext cx="9144000" cy="5144400"/>
+          </a:xfrm>
+          <a:prstGeom prst="rect">
+            <a:avLst/>
+          </a:prstGeom>
+        </p:spPr>
+      </p:pic>
+      <p:sp>
+        <p:nvSpPr>
+          <p:cNvPr id="3" name="TextBox 2"/>
+          <p:cNvSpPr txBox="1"/>
+          <p:nvPr/>
+        </p:nvSpPr>
+        <p:spPr>
+          <a:xfrm>
+            <a:off x="968400" y="550800"/>
+            <a:ext cx="6958799" cy="399600"/>
+          </a:xfrm>
+          <a:prstGeom prst="rect">
+            <a:avLst/>
+          </a:prstGeom>
+          <a:noFill/>
+        </p:spPr>
+        <p:txBody>
+          <a:bodyPr wrap="none" anchor="t">
+            <a:spAutoFit/>
+          </a:bodyPr>
+          <a:lstStyle/>
+          <a:p>
+            <a:pPr>
+              <a:defRPr sz="2000" b="1">
+                <a:solidFill>
+                  <a:srgbClr val="000000"/>
+                </a:solidFill>
+                <a:latin typeface="Calibri"/>
+              </a:defRPr>
+            </a:pPr>
+            <a:r>
+              <a:t>Conclusion</a:t>
+            </a:r>
+          </a:p>
+        </p:txBody>
+      </p:sp>
+      <p:sp>
+        <p:nvSpPr>
+          <p:cNvPr id="4" name="TextBox 3"/>
+          <p:cNvSpPr txBox="1"/>
+          <p:nvPr/>
+        </p:nvSpPr>
+        <p:spPr>
+          <a:xfrm>
+            <a:off x="4208400" y="1353600"/>
+            <a:ext cx="4287600" cy="3056400"/>
+          </a:xfrm>
+          <a:prstGeom prst="rect">
+            <a:avLst/>
+          </a:prstGeom>
+          <a:noFill/>
+        </p:spPr>
+        <p:txBody>
+          <a:bodyPr wrap="square" anchor="t">
+            <a:spAutoFit/>
+          </a:bodyPr>
+          <a:lstStyle/>
+          <a:p>
+            <a:pPr>
+              <a:defRPr sz="1200">
+                <a:solidFill>
+                  <a:srgbClr val="000000"/>
+                </a:solidFill>
+                <a:latin typeface="Calibri"/>
+              </a:defRPr>
+            </a:pPr>
+            <a:r>
+              <a:t>- Transformer: Groundbreaking architecture revolutionizing neural networks.</a:t>
+            </a:r>
+            <a:br/>
+            <a:br/>
+            <a:r>
+              <a:t>- Outshines traditional models with superior attention mechanisms.</a:t>
+            </a:r>
+            <a:br/>
+            <a:br/>
+            <a:r>
+              <a:t>- Transforms machine translation with unmatched efficiency and speed.</a:t>
+            </a:r>
+            <a:br/>
+            <a:br/>
+            <a:r>
+              <a:t>- Exhibits remarkable adaptability to complex tasks, including parsing.</a:t>
             </a:r>
           </a:p>
         </p:txBody>
@@ -3163,7 +3304,7 @@
 </file>
 
 <file path=ppt/slides/slide2.xml><?xml version="1.0" encoding="utf-8"?>
-<p:sld xmlns:a="http://schemas.openxmlformats.org/drawingml/2006/main" xmlns:p="http://schemas.openxmlformats.org/presentationml/2006/main" xmlns:r="http://schemas.openxmlformats.org/officeDocument/2006/relationships">
+<p:sld xmlns:a="http://schemas.openxmlformats.org/drawingml/2006/main" xmlns:r="http://schemas.openxmlformats.org/officeDocument/2006/relationships" xmlns:p="http://schemas.openxmlformats.org/presentationml/2006/main">
   <p:cSld>
     <p:spTree>
       <p:nvGrpSpPr>
@@ -3171,7 +3312,471 @@
         <p:cNvGrpSpPr/>
         <p:nvPr/>
       </p:nvGrpSpPr>
-      <p:grpSpPr/>
+      <p:grpSpPr>
+        <a:xfrm>
+          <a:off x="0" y="0"/>
+          <a:ext cx="0" cy="0"/>
+          <a:chOff x="0" y="0"/>
+          <a:chExt cx="0" cy="0"/>
+        </a:xfrm>
+      </p:grpSpPr>
+      <p:pic>
+        <p:nvPicPr>
+          <p:cNvPr id="2" name="Picture 1" descr="bg1.png"/>
+          <p:cNvPicPr>
+            <a:picLocks noChangeAspect="1"/>
+          </p:cNvPicPr>
+          <p:nvPr/>
+        </p:nvPicPr>
+        <p:blipFill>
+          <a:blip r:embed="rId2"/>
+          <a:stretch>
+            <a:fillRect/>
+          </a:stretch>
+        </p:blipFill>
+        <p:spPr>
+          <a:xfrm>
+            <a:off x="0" y="0"/>
+            <a:ext cx="9144000" cy="5144400"/>
+          </a:xfrm>
+          <a:prstGeom prst="rect">
+            <a:avLst/>
+          </a:prstGeom>
+        </p:spPr>
+      </p:pic>
+      <p:sp>
+        <p:nvSpPr>
+          <p:cNvPr id="3" name="TextBox 2"/>
+          <p:cNvSpPr txBox="1"/>
+          <p:nvPr/>
+        </p:nvSpPr>
+        <p:spPr>
+          <a:xfrm>
+            <a:off x="3794399" y="360000"/>
+            <a:ext cx="1558800" cy="784800"/>
+          </a:xfrm>
+          <a:prstGeom prst="rect">
+            <a:avLst/>
+          </a:prstGeom>
+          <a:noFill/>
+        </p:spPr>
+        <p:txBody>
+          <a:bodyPr wrap="none" anchor="t">
+            <a:spAutoFit/>
+          </a:bodyPr>
+          <a:lstStyle/>
+          <a:p>
+            <a:pPr>
+              <a:defRPr sz="4000" b="1">
+                <a:solidFill>
+                  <a:srgbClr val="000000"/>
+                </a:solidFill>
+                <a:latin typeface="Times New Roman"/>
+              </a:defRPr>
+            </a:pPr>
+            <a:r>
+              <a:t>Table of Contents</a:t>
+            </a:r>
+          </a:p>
+        </p:txBody>
+      </p:sp>
+      <p:sp>
+        <p:nvSpPr>
+          <p:cNvPr id="4" name="TextBox 3"/>
+          <p:cNvSpPr txBox="1"/>
+          <p:nvPr/>
+        </p:nvSpPr>
+        <p:spPr>
+          <a:xfrm>
+            <a:off x="4208400" y="1353600"/>
+            <a:ext cx="4287600" cy="3056400"/>
+          </a:xfrm>
+          <a:prstGeom prst="rect">
+            <a:avLst/>
+          </a:prstGeom>
+          <a:noFill/>
+        </p:spPr>
+        <p:txBody>
+          <a:bodyPr wrap="square" anchor="t">
+            <a:spAutoFit/>
+          </a:bodyPr>
+          <a:lstStyle/>
+          <a:p>
+            <a:pPr>
+              <a:defRPr sz="1200">
+                <a:solidFill>
+                  <a:srgbClr val="000000"/>
+                </a:solidFill>
+                <a:latin typeface="Times New Roman"/>
+              </a:defRPr>
+            </a:pPr>
+            <a:r>
+              <a:t>Introduction</a:t>
+            </a:r>
+            <a:br/>
+            <a:br/>
+            <a:r>
+              <a:t>Introduction of the Transformer architecture.</a:t>
+            </a:r>
+            <a:br/>
+            <a:br/>
+            <a:r>
+              <a:t>Superiority in machine translation tasks.</a:t>
+            </a:r>
+            <a:br/>
+            <a:br/>
+            <a:r>
+              <a:t>Elimination of recurrence and convolutions.</a:t>
+            </a:r>
+            <a:br/>
+            <a:br/>
+            <a:r>
+              <a:t>Efficiency in parallelization and training duration.</a:t>
+            </a:r>
+            <a:br/>
+            <a:br/>
+            <a:r>
+              <a:t>High BLEU scores on English-to-German and English-to-French tasks.</a:t>
+            </a:r>
+            <a:br/>
+            <a:br/>
+            <a:r>
+              <a:t>Generalization capabilities to English constituency parsing.</a:t>
+            </a:r>
+            <a:br/>
+            <a:br/>
+            <a:r>
+              <a:t>Conclusion</a:t>
+            </a:r>
+          </a:p>
+        </p:txBody>
+      </p:sp>
+    </p:spTree>
+  </p:cSld>
+  <p:clrMapOvr>
+    <a:masterClrMapping/>
+  </p:clrMapOvr>
+</p:sld>
+</file>
+
+<file path=ppt/slides/slide3.xml><?xml version="1.0" encoding="utf-8"?>
+<p:sld xmlns:a="http://schemas.openxmlformats.org/drawingml/2006/main" xmlns:r="http://schemas.openxmlformats.org/officeDocument/2006/relationships" xmlns:p="http://schemas.openxmlformats.org/presentationml/2006/main">
+  <p:cSld>
+    <p:spTree>
+      <p:nvGrpSpPr>
+        <p:cNvPr id="1" name=""/>
+        <p:cNvGrpSpPr/>
+        <p:nvPr/>
+      </p:nvGrpSpPr>
+      <p:grpSpPr>
+        <a:xfrm>
+          <a:off x="0" y="0"/>
+          <a:ext cx="0" cy="0"/>
+          <a:chOff x="0" y="0"/>
+          <a:chExt cx="0" cy="0"/>
+        </a:xfrm>
+      </p:grpSpPr>
+      <p:pic>
+        <p:nvPicPr>
+          <p:cNvPr id="2" name="Picture 1" descr="bg3.png"/>
+          <p:cNvPicPr>
+            <a:picLocks noChangeAspect="1"/>
+          </p:cNvPicPr>
+          <p:nvPr/>
+        </p:nvPicPr>
+        <p:blipFill>
+          <a:blip r:embed="rId2"/>
+          <a:stretch>
+            <a:fillRect/>
+          </a:stretch>
+        </p:blipFill>
+        <p:spPr>
+          <a:xfrm>
+            <a:off x="0" y="0"/>
+            <a:ext cx="9144000" cy="5144400"/>
+          </a:xfrm>
+          <a:prstGeom prst="rect">
+            <a:avLst/>
+          </a:prstGeom>
+        </p:spPr>
+      </p:pic>
+      <p:sp>
+        <p:nvSpPr>
+          <p:cNvPr id="3" name="TextBox 2"/>
+          <p:cNvSpPr txBox="1"/>
+          <p:nvPr/>
+        </p:nvSpPr>
+        <p:spPr>
+          <a:xfrm>
+            <a:off x="968400" y="550800"/>
+            <a:ext cx="6958799" cy="399600"/>
+          </a:xfrm>
+          <a:prstGeom prst="rect">
+            <a:avLst/>
+          </a:prstGeom>
+          <a:noFill/>
+        </p:spPr>
+        <p:txBody>
+          <a:bodyPr wrap="none" anchor="t">
+            <a:spAutoFit/>
+          </a:bodyPr>
+          <a:lstStyle/>
+          <a:p>
+            <a:pPr>
+              <a:defRPr sz="2000" b="1">
+                <a:solidFill>
+                  <a:srgbClr val="000000"/>
+                </a:solidFill>
+                <a:latin typeface="Calibri"/>
+              </a:defRPr>
+            </a:pPr>
+            <a:r>
+              <a:t>Introduction</a:t>
+            </a:r>
+          </a:p>
+        </p:txBody>
+      </p:sp>
+      <p:sp>
+        <p:nvSpPr>
+          <p:cNvPr id="4" name="TextBox 3"/>
+          <p:cNvSpPr txBox="1"/>
+          <p:nvPr/>
+        </p:nvSpPr>
+        <p:spPr>
+          <a:xfrm>
+            <a:off x="4208400" y="1353600"/>
+            <a:ext cx="4287600" cy="3056400"/>
+          </a:xfrm>
+          <a:prstGeom prst="rect">
+            <a:avLst/>
+          </a:prstGeom>
+          <a:noFill/>
+        </p:spPr>
+        <p:txBody>
+          <a:bodyPr wrap="square" anchor="t">
+            <a:spAutoFit/>
+          </a:bodyPr>
+          <a:lstStyle/>
+          <a:p>
+            <a:pPr>
+              <a:defRPr sz="1200">
+                <a:solidFill>
+                  <a:srgbClr val="000000"/>
+                </a:solidFill>
+                <a:latin typeface="Calibri"/>
+              </a:defRPr>
+            </a:pPr>
+            <a:r>
+              <a:t>- Unveiling the Transformer: A groundbreaking neural network architecture.</a:t>
+            </a:r>
+            <a:br/>
+            <a:br/>
+            <a:r>
+              <a:t>- Surpasses traditional models with advanced attention mechanisms.</a:t>
+            </a:r>
+            <a:br/>
+            <a:br/>
+            <a:r>
+              <a:t>- Achieves unprecedented efficiency in machine translation.</a:t>
+            </a:r>
+            <a:br/>
+            <a:br/>
+            <a:r>
+              <a:t>- Proves versatile in complex tasks like English constituency parsing.</a:t>
+            </a:r>
+          </a:p>
+        </p:txBody>
+      </p:sp>
+    </p:spTree>
+  </p:cSld>
+  <p:clrMapOvr>
+    <a:masterClrMapping/>
+  </p:clrMapOvr>
+</p:sld>
+</file>
+
+<file path=ppt/slides/slide4.xml><?xml version="1.0" encoding="utf-8"?>
+<p:sld xmlns:a="http://schemas.openxmlformats.org/drawingml/2006/main" xmlns:r="http://schemas.openxmlformats.org/officeDocument/2006/relationships" xmlns:p="http://schemas.openxmlformats.org/presentationml/2006/main">
+  <p:cSld>
+    <p:spTree>
+      <p:nvGrpSpPr>
+        <p:cNvPr id="1" name=""/>
+        <p:cNvGrpSpPr/>
+        <p:nvPr/>
+      </p:nvGrpSpPr>
+      <p:grpSpPr>
+        <a:xfrm>
+          <a:off x="0" y="0"/>
+          <a:ext cx="0" cy="0"/>
+          <a:chOff x="0" y="0"/>
+          <a:chExt cx="0" cy="0"/>
+        </a:xfrm>
+      </p:grpSpPr>
+      <p:pic>
+        <p:nvPicPr>
+          <p:cNvPr id="2" name="Picture 1" descr="bg3.png"/>
+          <p:cNvPicPr>
+            <a:picLocks noChangeAspect="1"/>
+          </p:cNvPicPr>
+          <p:nvPr/>
+        </p:nvPicPr>
+        <p:blipFill>
+          <a:blip r:embed="rId2"/>
+          <a:stretch>
+            <a:fillRect/>
+          </a:stretch>
+        </p:blipFill>
+        <p:spPr>
+          <a:xfrm>
+            <a:off x="0" y="0"/>
+            <a:ext cx="9144000" cy="5144400"/>
+          </a:xfrm>
+          <a:prstGeom prst="rect">
+            <a:avLst/>
+          </a:prstGeom>
+        </p:spPr>
+      </p:pic>
+      <p:sp>
+        <p:nvSpPr>
+          <p:cNvPr id="3" name="TextBox 2"/>
+          <p:cNvSpPr txBox="1"/>
+          <p:nvPr/>
+        </p:nvSpPr>
+        <p:spPr>
+          <a:xfrm>
+            <a:off x="968400" y="550800"/>
+            <a:ext cx="6958799" cy="399600"/>
+          </a:xfrm>
+          <a:prstGeom prst="rect">
+            <a:avLst/>
+          </a:prstGeom>
+          <a:noFill/>
+        </p:spPr>
+        <p:txBody>
+          <a:bodyPr wrap="none" anchor="t">
+            <a:spAutoFit/>
+          </a:bodyPr>
+          <a:lstStyle/>
+          <a:p>
+            <a:pPr>
+              <a:defRPr sz="2000" b="1">
+                <a:solidFill>
+                  <a:srgbClr val="000000"/>
+                </a:solidFill>
+                <a:latin typeface="Calibri"/>
+              </a:defRPr>
+            </a:pPr>
+            <a:r>
+              <a:t>Introduction of the Transformer architecture.</a:t>
+            </a:r>
+          </a:p>
+        </p:txBody>
+      </p:sp>
+      <p:sp>
+        <p:nvSpPr>
+          <p:cNvPr id="4" name="TextBox 3"/>
+          <p:cNvSpPr txBox="1"/>
+          <p:nvPr/>
+        </p:nvSpPr>
+        <p:spPr>
+          <a:xfrm>
+            <a:off x="4208400" y="1353600"/>
+            <a:ext cx="4287600" cy="3056400"/>
+          </a:xfrm>
+          <a:prstGeom prst="rect">
+            <a:avLst/>
+          </a:prstGeom>
+          <a:noFill/>
+        </p:spPr>
+        <p:txBody>
+          <a:bodyPr wrap="square" anchor="t">
+            <a:spAutoFit/>
+          </a:bodyPr>
+          <a:lstStyle/>
+          <a:p>
+            <a:pPr>
+              <a:defRPr sz="1200">
+                <a:solidFill>
+                  <a:srgbClr val="000000"/>
+                </a:solidFill>
+                <a:latin typeface="Calibri"/>
+              </a:defRPr>
+            </a:pPr>
+            <a:r>
+              <a:t>- Transformer: A novel neural network architecture.</a:t>
+            </a:r>
+            <a:br/>
+            <a:br/>
+            <a:r>
+              <a:t>- Eschews recurrence and convolutions for attention mechanisms.</a:t>
+            </a:r>
+            <a:br/>
+            <a:br/>
+            <a:r>
+              <a:t>- Yields superior machine translation quality.</a:t>
+            </a:r>
+            <a:br/>
+            <a:br/>
+            <a:r>
+              <a:t>- More parallelizable, trains faster than traditional models.</a:t>
+            </a:r>
+            <a:br/>
+            <a:br/>
+            <a:r>
+              <a:t>- Successfully applied to English constituency parsing.</a:t>
+            </a:r>
+          </a:p>
+        </p:txBody>
+      </p:sp>
+      <p:pic>
+        <p:nvPicPr>
+          <p:cNvPr id="5" name="Picture 4" descr="Figure_1_0.png"/>
+          <p:cNvPicPr>
+            <a:picLocks noChangeAspect="1"/>
+          </p:cNvPicPr>
+          <p:nvPr/>
+        </p:nvPicPr>
+        <p:blipFill>
+          <a:blip r:embed="rId3"/>
+          <a:stretch>
+            <a:fillRect/>
+          </a:stretch>
+        </p:blipFill>
+        <p:spPr>
+          <a:xfrm>
+            <a:off x="644400" y="1353600"/>
+            <a:ext cx="3351600" cy="3038400"/>
+          </a:xfrm>
+          <a:prstGeom prst="rect">
+            <a:avLst/>
+          </a:prstGeom>
+        </p:spPr>
+      </p:pic>
+    </p:spTree>
+  </p:cSld>
+  <p:clrMapOvr>
+    <a:masterClrMapping/>
+  </p:clrMapOvr>
+</p:sld>
+</file>
+
+<file path=ppt/slides/slide5.xml><?xml version="1.0" encoding="utf-8"?>
+<p:sld xmlns:a="http://schemas.openxmlformats.org/drawingml/2006/main" xmlns:r="http://schemas.openxmlformats.org/officeDocument/2006/relationships" xmlns:p="http://schemas.openxmlformats.org/presentationml/2006/main">
+  <p:cSld>
+    <p:spTree>
+      <p:nvGrpSpPr>
+        <p:cNvPr id="1" name=""/>
+        <p:cNvGrpSpPr/>
+        <p:nvPr/>
+      </p:nvGrpSpPr>
+      <p:grpSpPr>
+        <a:xfrm>
+          <a:off x="0" y="0"/>
+          <a:ext cx="0" cy="0"/>
+          <a:chOff x="0" y="0"/>
+          <a:chExt cx="0" cy="0"/>
+        </a:xfrm>
+      </p:grpSpPr>
       <p:pic>
         <p:nvPicPr>
           <p:cNvPr id="2" name="Picture 1" descr="bg2.png"/>
@@ -3204,8 +3809,8 @@
         </p:nvSpPr>
         <p:spPr>
           <a:xfrm>
-            <a:off x="3794399" y="360000"/>
-            <a:ext cx="1558800" cy="784800"/>
+            <a:off x="968400" y="550800"/>
+            <a:ext cx="6958799" cy="399600"/>
           </a:xfrm>
           <a:prstGeom prst="rect">
             <a:avLst/>
@@ -3219,15 +3824,15 @@
           <a:lstStyle/>
           <a:p>
             <a:pPr>
-              <a:defRPr b="1" sz="4000">
+              <a:defRPr sz="2000" b="1">
                 <a:solidFill>
                   <a:srgbClr val="000000"/>
                 </a:solidFill>
-                <a:latin typeface="Times New Roman"/>
+                <a:latin typeface="Calibri"/>
               </a:defRPr>
             </a:pPr>
             <a:r>
-              <a:t>Table of Contents</a:t>
+              <a:t>Superiority in machine translation tasks.</a:t>
             </a:r>
           </a:p>
         </p:txBody>
@@ -3259,31 +3864,31 @@
                 <a:solidFill>
                   <a:srgbClr val="000000"/>
                 </a:solidFill>
-                <a:latin typeface="Times New Roman"/>
+                <a:latin typeface="Calibri"/>
               </a:defRPr>
             </a:pPr>
             <a:r>
-              <a:t>Introduction</a:t>
-            </a:r>
-            <a:br/>
-            <a:br/>
-            <a:r>
-              <a:t>Introduction of the Transformer architecture.</a:t>
-            </a:r>
-            <a:br/>
-            <a:br/>
-            <a:r>
-              <a:t>Superiority over recurrent and convolutional models.</a:t>
-            </a:r>
-            <a:br/>
-            <a:br/>
-            <a:r>
-              <a:t>Advancements in training efficiency and parallelizability.</a:t>
-            </a:r>
-            <a:br/>
-            <a:br/>
-            <a:r>
-              <a:t>Conclusion</a:t>
+              <a:t>- Transformer architecture excels in machine translation.</a:t>
+            </a:r>
+            <a:br/>
+            <a:br/>
+            <a:r>
+              <a:t>- Outperforms recurrent and convolutional networks.</a:t>
+            </a:r>
+            <a:br/>
+            <a:br/>
+            <a:r>
+              <a:t>- Achieves high BLEU scores: 28.4 in English-to-German, 41.8 in English-to-French.</a:t>
+            </a:r>
+            <a:br/>
+            <a:br/>
+            <a:r>
+              <a:t>- Requires less training time on fewer GPUs.</a:t>
+            </a:r>
+            <a:br/>
+            <a:br/>
+            <a:r>
+              <a:t>- Demonstrates superior quality and parallelizability.</a:t>
             </a:r>
           </a:p>
         </p:txBody>
@@ -3296,8 +3901,8 @@
 </p:sld>
 </file>
 
-<file path=ppt/slides/slide3.xml><?xml version="1.0" encoding="utf-8"?>
-<p:sld xmlns:a="http://schemas.openxmlformats.org/drawingml/2006/main" xmlns:p="http://schemas.openxmlformats.org/presentationml/2006/main" xmlns:r="http://schemas.openxmlformats.org/officeDocument/2006/relationships">
+<file path=ppt/slides/slide6.xml><?xml version="1.0" encoding="utf-8"?>
+<p:sld xmlns:a="http://schemas.openxmlformats.org/drawingml/2006/main" xmlns:r="http://schemas.openxmlformats.org/officeDocument/2006/relationships" xmlns:p="http://schemas.openxmlformats.org/presentationml/2006/main">
   <p:cSld>
     <p:spTree>
       <p:nvGrpSpPr>
@@ -3305,7 +3910,14 @@
         <p:cNvGrpSpPr/>
         <p:nvPr/>
       </p:nvGrpSpPr>
-      <p:grpSpPr/>
+      <p:grpSpPr>
+        <a:xfrm>
+          <a:off x="0" y="0"/>
+          <a:ext cx="0" cy="0"/>
+          <a:chOff x="0" y="0"/>
+          <a:chExt cx="0" cy="0"/>
+        </a:xfrm>
+      </p:grpSpPr>
       <p:pic>
         <p:nvPicPr>
           <p:cNvPr id="2" name="Picture 1" descr="bg3.png"/>
@@ -3353,7 +3965,7 @@
           <a:lstStyle/>
           <a:p>
             <a:pPr>
-              <a:defRPr b="1" sz="2000">
+              <a:defRPr sz="2000" b="1">
                 <a:solidFill>
                   <a:srgbClr val="000000"/>
                 </a:solidFill>
@@ -3361,7 +3973,7 @@
               </a:defRPr>
             </a:pPr>
             <a:r>
-              <a:t>Introduction</a:t>
+              <a:t>Elimination of recurrence and convolutions.</a:t>
             </a:r>
           </a:p>
         </p:txBody>
@@ -3397,21 +4009,55 @@
               </a:defRPr>
             </a:pPr>
             <a:r>
-              <a:t>- The Transformer revolutionizes machine translation, introducing an innovative architecture that exclusively utilizes attention mechanisms.</a:t>
-            </a:r>
-            <a:br/>
-            <a:br/>
-            <a:r>
-              <a:t>- Surpassing conventional recurrent and convolutional models, it delivers enhanced quality and training efficiency.</a:t>
-            </a:r>
-            <a:br/>
-            <a:br/>
-            <a:r>
-              <a:t>- This groundbreaking approach sets new benchmarks in parallelizability, significantly reducing training time.</a:t>
-            </a:r>
-          </a:p>
-        </p:txBody>
-      </p:sp>
+              <a:t>- Transformer architecture innovates by eliminating recurrent and convolutional layers.</a:t>
+            </a:r>
+            <a:br/>
+            <a:br/>
+            <a:r>
+              <a:t>- Focuses solely on attention mechanisms for processing sequences.</a:t>
+            </a:r>
+            <a:br/>
+            <a:br/>
+            <a:r>
+              <a:t>- Results in superior parallelization and reduced training time.</a:t>
+            </a:r>
+            <a:br/>
+            <a:br/>
+            <a:r>
+              <a:t>- Achieves state-of-the-art performance in machine translation tasks.</a:t>
+            </a:r>
+            <a:br/>
+            <a:br/>
+            <a:r>
+              <a:t>- Demonstrates versatility by adapting to English constituency parsing.</a:t>
+            </a:r>
+          </a:p>
+        </p:txBody>
+      </p:sp>
+      <p:pic>
+        <p:nvPicPr>
+          <p:cNvPr id="5" name="Picture 4" descr="Figure_2_1.png"/>
+          <p:cNvPicPr>
+            <a:picLocks noChangeAspect="1"/>
+          </p:cNvPicPr>
+          <p:nvPr/>
+        </p:nvPicPr>
+        <p:blipFill>
+          <a:blip r:embed="rId3"/>
+          <a:stretch>
+            <a:fillRect/>
+          </a:stretch>
+        </p:blipFill>
+        <p:spPr>
+          <a:xfrm>
+            <a:off x="644400" y="1353600"/>
+            <a:ext cx="3351600" cy="3038400"/>
+          </a:xfrm>
+          <a:prstGeom prst="rect">
+            <a:avLst/>
+          </a:prstGeom>
+        </p:spPr>
+      </p:pic>
     </p:spTree>
   </p:cSld>
   <p:clrMapOvr>
@@ -3420,8 +4066,8 @@
 </p:sld>
 </file>
 
-<file path=ppt/slides/slide4.xml><?xml version="1.0" encoding="utf-8"?>
-<p:sld xmlns:a="http://schemas.openxmlformats.org/drawingml/2006/main" xmlns:p="http://schemas.openxmlformats.org/presentationml/2006/main" xmlns:r="http://schemas.openxmlformats.org/officeDocument/2006/relationships">
+<file path=ppt/slides/slide7.xml><?xml version="1.0" encoding="utf-8"?>
+<p:sld xmlns:a="http://schemas.openxmlformats.org/drawingml/2006/main" xmlns:r="http://schemas.openxmlformats.org/officeDocument/2006/relationships" xmlns:p="http://schemas.openxmlformats.org/presentationml/2006/main">
   <p:cSld>
     <p:spTree>
       <p:nvGrpSpPr>
@@ -3429,7 +4075,14 @@
         <p:cNvGrpSpPr/>
         <p:nvPr/>
       </p:nvGrpSpPr>
-      <p:grpSpPr/>
+      <p:grpSpPr>
+        <a:xfrm>
+          <a:off x="0" y="0"/>
+          <a:ext cx="0" cy="0"/>
+          <a:chOff x="0" y="0"/>
+          <a:chExt cx="0" cy="0"/>
+        </a:xfrm>
+      </p:grpSpPr>
       <p:pic>
         <p:nvPicPr>
           <p:cNvPr id="2" name="Picture 1" descr="bg3.png"/>
@@ -3477,7 +4130,7 @@
           <a:lstStyle/>
           <a:p>
             <a:pPr>
-              <a:defRPr b="1" sz="2000">
+              <a:defRPr sz="2000" b="1">
                 <a:solidFill>
                   <a:srgbClr val="000000"/>
                 </a:solidFill>
@@ -3485,7 +4138,7 @@
               </a:defRPr>
             </a:pPr>
             <a:r>
-              <a:t>Introduction of the Transformer architecture.</a:t>
+              <a:t>Efficiency in parallelization and training duration.</a:t>
             </a:r>
           </a:p>
         </p:txBody>
@@ -3521,27 +4174,22 @@
               </a:defRPr>
             </a:pPr>
             <a:r>
-              <a:t>- Introduces Transformer, a novel architecture.</a:t>
-            </a:r>
-            <a:br/>
-            <a:br/>
-            <a:r>
-              <a:t>- Relies solely on attention mechanisms.</a:t>
-            </a:r>
-            <a:br/>
-            <a:br/>
-            <a:r>
-              <a:t>- Outperforms traditional sequence models.</a:t>
-            </a:r>
-            <a:br/>
-            <a:br/>
-            <a:r>
-              <a:t>- Enhances quality and training efficiency.</a:t>
-            </a:r>
-            <a:br/>
-            <a:br/>
-            <a:r>
-              <a:t>- Achieves state-of-the-art results in translation.</a:t>
+              <a:t>- Transformer architecture excels in parallelization, boosting efficiency.</a:t>
+            </a:r>
+            <a:br/>
+            <a:br/>
+            <a:r>
+              <a:t>- Training time is significantly reduced compared to traditional models.</a:t>
+            </a:r>
+            <a:br/>
+            <a:br/>
+            <a:r>
+              <a:t>- Achieves superior machine translation quality with less computational cost.</a:t>
+            </a:r>
+            <a:br/>
+            <a:br/>
+            <a:r>
+              <a:t>- Demonstrates versatility by adapting to English constituency parsing tasks.</a:t>
             </a:r>
           </a:p>
         </p:txBody>
@@ -3554,8 +4202,8 @@
 </p:sld>
 </file>
 
-<file path=ppt/slides/slide5.xml><?xml version="1.0" encoding="utf-8"?>
-<p:sld xmlns:a="http://schemas.openxmlformats.org/drawingml/2006/main" xmlns:p="http://schemas.openxmlformats.org/presentationml/2006/main" xmlns:r="http://schemas.openxmlformats.org/officeDocument/2006/relationships">
+<file path=ppt/slides/slide8.xml><?xml version="1.0" encoding="utf-8"?>
+<p:sld xmlns:a="http://schemas.openxmlformats.org/drawingml/2006/main" xmlns:r="http://schemas.openxmlformats.org/officeDocument/2006/relationships" xmlns:p="http://schemas.openxmlformats.org/presentationml/2006/main">
   <p:cSld>
     <p:spTree>
       <p:nvGrpSpPr>
@@ -3563,131 +4211,14 @@
         <p:cNvGrpSpPr/>
         <p:nvPr/>
       </p:nvGrpSpPr>
-      <p:grpSpPr/>
-      <p:pic>
-        <p:nvPicPr>
-          <p:cNvPr id="2" name="Picture 1" descr="bg2.png"/>
-          <p:cNvPicPr>
-            <a:picLocks noChangeAspect="1"/>
-          </p:cNvPicPr>
-          <p:nvPr/>
-        </p:nvPicPr>
-        <p:blipFill>
-          <a:blip r:embed="rId2"/>
-          <a:stretch>
-            <a:fillRect/>
-          </a:stretch>
-        </p:blipFill>
-        <p:spPr>
-          <a:xfrm>
-            <a:off x="0" y="0"/>
-            <a:ext cx="9144000" cy="5144400"/>
-          </a:xfrm>
-          <a:prstGeom prst="rect">
-            <a:avLst/>
-          </a:prstGeom>
-        </p:spPr>
-      </p:pic>
-      <p:sp>
-        <p:nvSpPr>
-          <p:cNvPr id="3" name="TextBox 2"/>
-          <p:cNvSpPr txBox="1"/>
-          <p:nvPr/>
-        </p:nvSpPr>
-        <p:spPr>
-          <a:xfrm>
-            <a:off x="968400" y="550800"/>
-            <a:ext cx="6958799" cy="399600"/>
-          </a:xfrm>
-          <a:prstGeom prst="rect">
-            <a:avLst/>
-          </a:prstGeom>
-          <a:noFill/>
-        </p:spPr>
-        <p:txBody>
-          <a:bodyPr wrap="none" anchor="t">
-            <a:spAutoFit/>
-          </a:bodyPr>
-          <a:lstStyle/>
-          <a:p>
-            <a:pPr>
-              <a:defRPr b="1" sz="2000">
-                <a:solidFill>
-                  <a:srgbClr val="000000"/>
-                </a:solidFill>
-                <a:latin typeface="Calibri"/>
-              </a:defRPr>
-            </a:pPr>
-            <a:r>
-              <a:t>Superiority over recurrent and convolutional models.</a:t>
-            </a:r>
-          </a:p>
-        </p:txBody>
-      </p:sp>
-      <p:sp>
-        <p:nvSpPr>
-          <p:cNvPr id="4" name="TextBox 3"/>
-          <p:cNvSpPr txBox="1"/>
-          <p:nvPr/>
-        </p:nvSpPr>
-        <p:spPr>
-          <a:xfrm>
-            <a:off x="4208400" y="1353600"/>
-            <a:ext cx="4287600" cy="3056400"/>
-          </a:xfrm>
-          <a:prstGeom prst="rect">
-            <a:avLst/>
-          </a:prstGeom>
-          <a:noFill/>
-        </p:spPr>
-        <p:txBody>
-          <a:bodyPr wrap="square" anchor="t">
-            <a:spAutoFit/>
-          </a:bodyPr>
-          <a:lstStyle/>
-          <a:p>
-            <a:pPr>
-              <a:defRPr sz="1200">
-                <a:solidFill>
-                  <a:srgbClr val="000000"/>
-                </a:solidFill>
-                <a:latin typeface="Calibri"/>
-              </a:defRPr>
-            </a:pPr>
-            <a:r>
-              <a:t>- Transformer outshines traditional models with its unique attention-based architecture.</a:t>
-            </a:r>
-            <a:br/>
-            <a:br/>
-            <a:r>
-              <a:t>- It surpasses recurrent and convolutional networks in translation tasks.</a:t>
-            </a:r>
-            <a:br/>
-            <a:br/>
-            <a:r>
-              <a:t>- Demonstrates higher quality, efficiency, and faster training times.</a:t>
-            </a:r>
-          </a:p>
-        </p:txBody>
-      </p:sp>
-    </p:spTree>
-  </p:cSld>
-  <p:clrMapOvr>
-    <a:masterClrMapping/>
-  </p:clrMapOvr>
-</p:sld>
-</file>
-
-<file path=ppt/slides/slide6.xml><?xml version="1.0" encoding="utf-8"?>
-<p:sld xmlns:a="http://schemas.openxmlformats.org/drawingml/2006/main" xmlns:p="http://schemas.openxmlformats.org/presentationml/2006/main" xmlns:r="http://schemas.openxmlformats.org/officeDocument/2006/relationships">
-  <p:cSld>
-    <p:spTree>
-      <p:nvGrpSpPr>
-        <p:cNvPr id="1" name=""/>
-        <p:cNvGrpSpPr/>
-        <p:nvPr/>
-      </p:nvGrpSpPr>
-      <p:grpSpPr/>
+      <p:grpSpPr>
+        <a:xfrm>
+          <a:off x="0" y="0"/>
+          <a:ext cx="0" cy="0"/>
+          <a:chOff x="0" y="0"/>
+          <a:chExt cx="0" cy="0"/>
+        </a:xfrm>
+      </p:grpSpPr>
       <p:pic>
         <p:nvPicPr>
           <p:cNvPr id="2" name="Picture 1" descr="bg3.png"/>
@@ -3735,7 +4266,7 @@
           <a:lstStyle/>
           <a:p>
             <a:pPr>
-              <a:defRPr b="1" sz="2000">
+              <a:defRPr sz="2000" b="1">
                 <a:solidFill>
                   <a:srgbClr val="000000"/>
                 </a:solidFill>
@@ -3743,7 +4274,7 @@
               </a:defRPr>
             </a:pPr>
             <a:r>
-              <a:t>Advancements in training efficiency and parallelizability.</a:t>
+              <a:t>High BLEU scores on English-to-German and English-to-French tasks.</a:t>
             </a:r>
           </a:p>
         </p:txBody>
@@ -3779,17 +4310,17 @@
               </a:defRPr>
             </a:pPr>
             <a:r>
-              <a:t>- Transformer architecture boosts training speed.</a:t>
-            </a:r>
-            <a:br/>
-            <a:br/>
-            <a:r>
-              <a:t>- Parallel processing surpasses prior models.</a:t>
-            </a:r>
-            <a:br/>
-            <a:br/>
-            <a:r>
-              <a:t>- Less time to train with superior results.</a:t>
+              <a:t>- Transformer network achieves high BLEU scores, surpassing previous models.</a:t>
+            </a:r>
+            <a:br/>
+            <a:br/>
+            <a:r>
+              <a:t>- Scores: 28.4 for English-to-German; 41.8 for English-to-French.</a:t>
+            </a:r>
+            <a:br/>
+            <a:br/>
+            <a:r>
+              <a:t>- Results indicate significant advancements in machine translation efficiency.</a:t>
             </a:r>
           </a:p>
         </p:txBody>
@@ -3802,8 +4333,8 @@
 </p:sld>
 </file>
 
-<file path=ppt/slides/slide7.xml><?xml version="1.0" encoding="utf-8"?>
-<p:sld xmlns:a="http://schemas.openxmlformats.org/drawingml/2006/main" xmlns:p="http://schemas.openxmlformats.org/presentationml/2006/main" xmlns:r="http://schemas.openxmlformats.org/officeDocument/2006/relationships">
+<file path=ppt/slides/slide9.xml><?xml version="1.0" encoding="utf-8"?>
+<p:sld xmlns:a="http://schemas.openxmlformats.org/drawingml/2006/main" xmlns:r="http://schemas.openxmlformats.org/officeDocument/2006/relationships" xmlns:p="http://schemas.openxmlformats.org/presentationml/2006/main">
   <p:cSld>
     <p:spTree>
       <p:nvGrpSpPr>
@@ -3811,10 +4342,17 @@
         <p:cNvGrpSpPr/>
         <p:nvPr/>
       </p:nvGrpSpPr>
-      <p:grpSpPr/>
+      <p:grpSpPr>
+        <a:xfrm>
+          <a:off x="0" y="0"/>
+          <a:ext cx="0" cy="0"/>
+          <a:chOff x="0" y="0"/>
+          <a:chExt cx="0" cy="0"/>
+        </a:xfrm>
+      </p:grpSpPr>
       <p:pic>
         <p:nvPicPr>
-          <p:cNvPr id="2" name="Picture 1" descr="bg2.png"/>
+          <p:cNvPr id="2" name="Picture 1" descr="bg1.png"/>
           <p:cNvPicPr>
             <a:picLocks noChangeAspect="1"/>
           </p:cNvPicPr>
@@ -3859,7 +4397,7 @@
           <a:lstStyle/>
           <a:p>
             <a:pPr>
-              <a:defRPr b="1" sz="2000">
+              <a:defRPr sz="2000" b="1">
                 <a:solidFill>
                   <a:srgbClr val="000000"/>
                 </a:solidFill>
@@ -3867,7 +4405,7 @@
               </a:defRPr>
             </a:pPr>
             <a:r>
-              <a:t>Conclusion</a:t>
+              <a:t>Generalization capabilities to English constituency parsing.</a:t>
             </a:r>
           </a:p>
         </p:txBody>
@@ -3903,17 +4441,27 @@
               </a:defRPr>
             </a:pPr>
             <a:r>
-              <a:t>- In summary, the Transformer represents a paradigm shift in machine translation, eschewing traditional models for a purely attention-based architecture.</a:t>
-            </a:r>
-            <a:br/>
-            <a:br/>
-            <a:r>
-              <a:t>- It eclipses previous recurrent and convolutional approaches by delivering superior translation quality and efficiency.</a:t>
-            </a:r>
-            <a:br/>
-            <a:br/>
-            <a:r>
-              <a:t>- The model's cutting-edge design not only sets new performance standards but also dramatically decreases the time required for training.</a:t>
+              <a:t>- Transformer architecture excels in machine translation.</a:t>
+            </a:r>
+            <a:br/>
+            <a:br/>
+            <a:r>
+              <a:t>- It outperforms traditional models using attention mechanisms.</a:t>
+            </a:r>
+            <a:br/>
+            <a:br/>
+            <a:r>
+              <a:t>- Demonstrates efficiency in training time and adaptability.</a:t>
+            </a:r>
+            <a:br/>
+            <a:br/>
+            <a:r>
+              <a:t>- Successfully applied to English constituency parsing.</a:t>
+            </a:r>
+            <a:br/>
+            <a:br/>
+            <a:r>
+              <a:t>- Shows promise in generalizing beyond initial design scope.</a:t>
             </a:r>
           </a:p>
         </p:txBody>

</xml_diff>